<commit_message>
Swapping our homegrown PseudoRedis with the open source fakeredis
</commit_message>
<xml_diff>
--- a/redis-groupon.pptx
+++ b/redis-groupon.pptx
@@ -4941,11 +4941,15 @@
           <a:lstStyle/>
           <a:p>
             <a:r>
+              <a:rPr lang="en-US" dirty="0" err="1"/>
+              <a:t>f</a:t>
+            </a:r>
+            <a:r>
               <a:rPr lang="en-US" dirty="0" err="1" smtClean="0"/>
-              <a:t>PseudoRedis</a:t>
-            </a:r>
-            <a:r>
-              <a:rPr lang="en-US" dirty="0"/>
+              <a:t>akeredis</a:t>
+            </a:r>
+            <a:r>
+              <a:rPr lang="en-US" dirty="0" smtClean="0"/>
               <a:t> </a:t>
             </a:r>
             <a:r>
@@ -4960,7 +4964,7 @@
       </p:sp>
       <p:pic>
         <p:nvPicPr>
-          <p:cNvPr id="4" name="Picture 3" descr="10-pseudo_redis.rb.jpg"/>
+          <p:cNvPr id="7" name="Picture 6" descr="10-pseudo_redis.rb-2.jpg"/>
           <p:cNvPicPr>
             <a:picLocks noChangeAspect="1"/>
           </p:cNvPicPr>
@@ -4980,8 +4984,8 @@
         </p:blipFill>
         <p:spPr>
           <a:xfrm>
-            <a:off x="727055" y="1417638"/>
-            <a:ext cx="7667592" cy="5963682"/>
+            <a:off x="0" y="1417638"/>
+            <a:ext cx="9144000" cy="4267200"/>
           </a:xfrm>
           <a:prstGeom prst="rect">
             <a:avLst/>
@@ -5470,6 +5474,86 @@
               <a:t>Questions?</a:t>
             </a:r>
             <a:endParaRPr lang="en-US" dirty="0"/>
+          </a:p>
+        </p:txBody>
+      </p:sp>
+      <p:sp>
+        <p:nvSpPr>
+          <p:cNvPr id="3" name="Title 1"/>
+          <p:cNvSpPr txBox="1">
+            <a:spLocks/>
+          </p:cNvSpPr>
+          <p:nvPr/>
+        </p:nvSpPr>
+        <p:spPr>
+          <a:xfrm>
+            <a:off x="609600" y="3872965"/>
+            <a:ext cx="8229600" cy="1786198"/>
+          </a:xfrm>
+          <a:prstGeom prst="rect">
+            <a:avLst/>
+          </a:prstGeom>
+        </p:spPr>
+        <p:txBody>
+          <a:bodyPr vert="horz" lIns="91440" tIns="45720" rIns="91440" bIns="45720" rtlCol="0" anchor="ctr">
+            <a:normAutofit/>
+          </a:bodyPr>
+          <a:lstStyle>
+            <a:lvl1pPr algn="ctr" defTabSz="914400" rtl="0" eaLnBrk="1" latinLnBrk="0" hangingPunct="1">
+              <a:spcBef>
+                <a:spcPct val="0"/>
+              </a:spcBef>
+              <a:buNone/>
+              <a:defRPr sz="4400" kern="1200">
+                <a:solidFill>
+                  <a:schemeClr val="tx1"/>
+                </a:solidFill>
+                <a:latin typeface="+mj-lt"/>
+                <a:ea typeface="+mj-ea"/>
+                <a:cs typeface="+mj-cs"/>
+              </a:defRPr>
+            </a:lvl1pPr>
+          </a:lstStyle>
+          <a:p>
+            <a:r>
+              <a:rPr lang="en-US" dirty="0" smtClean="0"/>
+              <a:t>Source and Slides at</a:t>
+            </a:r>
+          </a:p>
+          <a:p>
+            <a:r>
+              <a:rPr lang="en-US" sz="2800" dirty="0"/>
+              <a:t>https://</a:t>
+            </a:r>
+            <a:r>
+              <a:rPr lang="en-US" sz="2800" dirty="0" err="1"/>
+              <a:t>github.com</a:t>
+            </a:r>
+            <a:r>
+              <a:rPr lang="en-US" sz="2800" dirty="0"/>
+              <a:t>/</a:t>
+            </a:r>
+            <a:r>
+              <a:rPr lang="en-US" sz="2800" dirty="0" err="1"/>
+              <a:t>redsquirrel</a:t>
+            </a:r>
+            <a:r>
+              <a:rPr lang="en-US" sz="2800" dirty="0"/>
+              <a:t>/</a:t>
+            </a:r>
+            <a:r>
+              <a:rPr lang="en-US" sz="2800" dirty="0" err="1"/>
+              <a:t>redis</a:t>
+            </a:r>
+            <a:r>
+              <a:rPr lang="en-US" sz="2800" dirty="0"/>
+              <a:t>-at-</a:t>
+            </a:r>
+            <a:r>
+              <a:rPr lang="en-US" sz="2800" dirty="0" err="1"/>
+              <a:t>groupon</a:t>
+            </a:r>
+            <a:endParaRPr lang="en-US" sz="2800" dirty="0"/>
           </a:p>
         </p:txBody>
       </p:sp>

</xml_diff>

<commit_message>
Slides updated for Ruby on Ales
</commit_message>
<xml_diff>
--- a/redis-groupon.pptx
+++ b/redis-groupon.pptx
@@ -2,13 +2,13 @@
 <file path=ppt/presentation.xml><?xml version="1.0" encoding="utf-8"?>
 <p:presentation xmlns:a="http://schemas.openxmlformats.org/drawingml/2006/main" xmlns:r="http://schemas.openxmlformats.org/officeDocument/2006/relationships" xmlns:p="http://schemas.openxmlformats.org/presentationml/2006/main" saveSubsetFonts="1">
   <p:sldMasterIdLst>
-    <p:sldMasterId id="2147483648" r:id="rId1"/>
+    <p:sldMasterId id="2147483661" r:id="rId1"/>
   </p:sldMasterIdLst>
   <p:sldIdLst>
     <p:sldId id="257" r:id="rId2"/>
     <p:sldId id="258" r:id="rId3"/>
     <p:sldId id="259" r:id="rId4"/>
-    <p:sldId id="265" r:id="rId5"/>
+    <p:sldId id="285" r:id="rId5"/>
     <p:sldId id="264" r:id="rId6"/>
     <p:sldId id="266" r:id="rId7"/>
     <p:sldId id="267" r:id="rId8"/>
@@ -27,8 +27,9 @@
     <p:sldId id="279" r:id="rId21"/>
     <p:sldId id="280" r:id="rId22"/>
     <p:sldId id="281" r:id="rId23"/>
-    <p:sldId id="282" r:id="rId24"/>
-    <p:sldId id="284" r:id="rId25"/>
+    <p:sldId id="286" r:id="rId24"/>
+    <p:sldId id="282" r:id="rId25"/>
+    <p:sldId id="284" r:id="rId26"/>
   </p:sldIdLst>
   <p:sldSz cx="9144000" cy="6858000" type="screen4x3"/>
   <p:notesSz cx="6858000" cy="9144000"/>
@@ -311,7 +312,7 @@
           <a:p>
             <a:fld id="{6BFECD78-3C8E-49F2-8FAB-59489D168ABB}" type="datetimeFigureOut">
               <a:rPr lang="en-US" smtClean="0"/>
-              <a:t>2/21/12</a:t>
+              <a:t>3/2/12</a:t>
             </a:fld>
             <a:endParaRPr lang="en-US"/>
           </a:p>
@@ -362,7 +363,7 @@
     </p:spTree>
     <p:extLst>
       <p:ext uri="{BB962C8B-B14F-4D97-AF65-F5344CB8AC3E}">
-        <p14:creationId xmlns:p14="http://schemas.microsoft.com/office/powerpoint/2010/main" val="2702019936"/>
+        <p14:creationId xmlns:p14="http://schemas.microsoft.com/office/powerpoint/2010/main" val="3220225926"/>
       </p:ext>
     </p:extLst>
   </p:cSld>
@@ -481,7 +482,7 @@
           <a:p>
             <a:fld id="{6BFECD78-3C8E-49F2-8FAB-59489D168ABB}" type="datetimeFigureOut">
               <a:rPr lang="en-US" smtClean="0"/>
-              <a:t>2/21/12</a:t>
+              <a:t>3/2/12</a:t>
             </a:fld>
             <a:endParaRPr lang="en-US"/>
           </a:p>
@@ -532,7 +533,7 @@
     </p:spTree>
     <p:extLst>
       <p:ext uri="{BB962C8B-B14F-4D97-AF65-F5344CB8AC3E}">
-        <p14:creationId xmlns:p14="http://schemas.microsoft.com/office/powerpoint/2010/main" val="2949498235"/>
+        <p14:creationId xmlns:p14="http://schemas.microsoft.com/office/powerpoint/2010/main" val="2133758745"/>
       </p:ext>
     </p:extLst>
   </p:cSld>
@@ -661,7 +662,7 @@
           <a:p>
             <a:fld id="{6BFECD78-3C8E-49F2-8FAB-59489D168ABB}" type="datetimeFigureOut">
               <a:rPr lang="en-US" smtClean="0"/>
-              <a:t>2/21/12</a:t>
+              <a:t>3/2/12</a:t>
             </a:fld>
             <a:endParaRPr lang="en-US"/>
           </a:p>
@@ -712,7 +713,7 @@
     </p:spTree>
     <p:extLst>
       <p:ext uri="{BB962C8B-B14F-4D97-AF65-F5344CB8AC3E}">
-        <p14:creationId xmlns:p14="http://schemas.microsoft.com/office/powerpoint/2010/main" val="1427941222"/>
+        <p14:creationId xmlns:p14="http://schemas.microsoft.com/office/powerpoint/2010/main" val="1431614892"/>
       </p:ext>
     </p:extLst>
   </p:cSld>
@@ -1059,7 +1060,7 @@
           <a:p>
             <a:fld id="{6BFECD78-3C8E-49F2-8FAB-59489D168ABB}" type="datetimeFigureOut">
               <a:rPr lang="en-US" smtClean="0"/>
-              <a:t>2/21/12</a:t>
+              <a:t>3/2/12</a:t>
             </a:fld>
             <a:endParaRPr lang="en-US"/>
           </a:p>
@@ -1110,7 +1111,7 @@
     </p:spTree>
     <p:extLst>
       <p:ext uri="{BB962C8B-B14F-4D97-AF65-F5344CB8AC3E}">
-        <p14:creationId xmlns:p14="http://schemas.microsoft.com/office/powerpoint/2010/main" val="2275933374"/>
+        <p14:creationId xmlns:p14="http://schemas.microsoft.com/office/powerpoint/2010/main" val="1393064602"/>
       </p:ext>
     </p:extLst>
   </p:cSld>
@@ -1305,7 +1306,7 @@
           <a:p>
             <a:fld id="{6BFECD78-3C8E-49F2-8FAB-59489D168ABB}" type="datetimeFigureOut">
               <a:rPr lang="en-US" smtClean="0"/>
-              <a:t>2/21/12</a:t>
+              <a:t>3/2/12</a:t>
             </a:fld>
             <a:endParaRPr lang="en-US"/>
           </a:p>
@@ -1356,7 +1357,7 @@
     </p:spTree>
     <p:extLst>
       <p:ext uri="{BB962C8B-B14F-4D97-AF65-F5344CB8AC3E}">
-        <p14:creationId xmlns:p14="http://schemas.microsoft.com/office/powerpoint/2010/main" val="1798952600"/>
+        <p14:creationId xmlns:p14="http://schemas.microsoft.com/office/powerpoint/2010/main" val="1644918494"/>
       </p:ext>
     </p:extLst>
   </p:cSld>
@@ -1593,7 +1594,7 @@
           <a:p>
             <a:fld id="{6BFECD78-3C8E-49F2-8FAB-59489D168ABB}" type="datetimeFigureOut">
               <a:rPr lang="en-US" smtClean="0"/>
-              <a:t>2/21/12</a:t>
+              <a:t>3/2/12</a:t>
             </a:fld>
             <a:endParaRPr lang="en-US"/>
           </a:p>
@@ -1644,7 +1645,7 @@
     </p:spTree>
     <p:extLst>
       <p:ext uri="{BB962C8B-B14F-4D97-AF65-F5344CB8AC3E}">
-        <p14:creationId xmlns:p14="http://schemas.microsoft.com/office/powerpoint/2010/main" val="1034301619"/>
+        <p14:creationId xmlns:p14="http://schemas.microsoft.com/office/powerpoint/2010/main" val="4087851384"/>
       </p:ext>
     </p:extLst>
   </p:cSld>
@@ -2015,7 +2016,7 @@
           <a:p>
             <a:fld id="{6BFECD78-3C8E-49F2-8FAB-59489D168ABB}" type="datetimeFigureOut">
               <a:rPr lang="en-US" smtClean="0"/>
-              <a:t>2/21/12</a:t>
+              <a:t>3/2/12</a:t>
             </a:fld>
             <a:endParaRPr lang="en-US"/>
           </a:p>
@@ -2066,7 +2067,7 @@
     </p:spTree>
     <p:extLst>
       <p:ext uri="{BB962C8B-B14F-4D97-AF65-F5344CB8AC3E}">
-        <p14:creationId xmlns:p14="http://schemas.microsoft.com/office/powerpoint/2010/main" val="1417940929"/>
+        <p14:creationId xmlns:p14="http://schemas.microsoft.com/office/powerpoint/2010/main" val="193377590"/>
       </p:ext>
     </p:extLst>
   </p:cSld>
@@ -2133,7 +2134,7 @@
           <a:p>
             <a:fld id="{6BFECD78-3C8E-49F2-8FAB-59489D168ABB}" type="datetimeFigureOut">
               <a:rPr lang="en-US" smtClean="0"/>
-              <a:t>2/21/12</a:t>
+              <a:t>3/2/12</a:t>
             </a:fld>
             <a:endParaRPr lang="en-US"/>
           </a:p>
@@ -2184,7 +2185,7 @@
     </p:spTree>
     <p:extLst>
       <p:ext uri="{BB962C8B-B14F-4D97-AF65-F5344CB8AC3E}">
-        <p14:creationId xmlns:p14="http://schemas.microsoft.com/office/powerpoint/2010/main" val="656067729"/>
+        <p14:creationId xmlns:p14="http://schemas.microsoft.com/office/powerpoint/2010/main" val="728577566"/>
       </p:ext>
     </p:extLst>
   </p:cSld>
@@ -2228,7 +2229,7 @@
           <a:p>
             <a:fld id="{6BFECD78-3C8E-49F2-8FAB-59489D168ABB}" type="datetimeFigureOut">
               <a:rPr lang="en-US" smtClean="0"/>
-              <a:t>2/21/12</a:t>
+              <a:t>3/2/12</a:t>
             </a:fld>
             <a:endParaRPr lang="en-US"/>
           </a:p>
@@ -2279,7 +2280,7 @@
     </p:spTree>
     <p:extLst>
       <p:ext uri="{BB962C8B-B14F-4D97-AF65-F5344CB8AC3E}">
-        <p14:creationId xmlns:p14="http://schemas.microsoft.com/office/powerpoint/2010/main" val="1249128790"/>
+        <p14:creationId xmlns:p14="http://schemas.microsoft.com/office/powerpoint/2010/main" val="2825645531"/>
       </p:ext>
     </p:extLst>
   </p:cSld>
@@ -2505,7 +2506,7 @@
           <a:p>
             <a:fld id="{6BFECD78-3C8E-49F2-8FAB-59489D168ABB}" type="datetimeFigureOut">
               <a:rPr lang="en-US" smtClean="0"/>
-              <a:t>2/21/12</a:t>
+              <a:t>3/2/12</a:t>
             </a:fld>
             <a:endParaRPr lang="en-US"/>
           </a:p>
@@ -2556,7 +2557,7 @@
     </p:spTree>
     <p:extLst>
       <p:ext uri="{BB962C8B-B14F-4D97-AF65-F5344CB8AC3E}">
-        <p14:creationId xmlns:p14="http://schemas.microsoft.com/office/powerpoint/2010/main" val="2730116199"/>
+        <p14:creationId xmlns:p14="http://schemas.microsoft.com/office/powerpoint/2010/main" val="2147183647"/>
       </p:ext>
     </p:extLst>
   </p:cSld>
@@ -2672,10 +2673,6 @@
             </a:lvl9pPr>
           </a:lstStyle>
           <a:p>
-            <a:r>
-              <a:rPr lang="en-US" smtClean="0"/>
-              <a:t>Drag picture to placeholder or click icon to add</a:t>
-            </a:r>
             <a:endParaRPr lang="en-US"/>
           </a:p>
         </p:txBody>
@@ -2762,7 +2759,7 @@
           <a:p>
             <a:fld id="{6BFECD78-3C8E-49F2-8FAB-59489D168ABB}" type="datetimeFigureOut">
               <a:rPr lang="en-US" smtClean="0"/>
-              <a:t>2/21/12</a:t>
+              <a:t>3/2/12</a:t>
             </a:fld>
             <a:endParaRPr lang="en-US"/>
           </a:p>
@@ -2813,7 +2810,7 @@
     </p:spTree>
     <p:extLst>
       <p:ext uri="{BB962C8B-B14F-4D97-AF65-F5344CB8AC3E}">
-        <p14:creationId xmlns:p14="http://schemas.microsoft.com/office/powerpoint/2010/main" val="506574558"/>
+        <p14:creationId xmlns:p14="http://schemas.microsoft.com/office/powerpoint/2010/main" val="475418048"/>
       </p:ext>
     </p:extLst>
   </p:cSld>
@@ -2975,7 +2972,7 @@
           <a:p>
             <a:fld id="{6BFECD78-3C8E-49F2-8FAB-59489D168ABB}" type="datetimeFigureOut">
               <a:rPr lang="en-US" smtClean="0"/>
-              <a:t>2/21/12</a:t>
+              <a:t>3/2/12</a:t>
             </a:fld>
             <a:endParaRPr lang="en-US"/>
           </a:p>
@@ -3062,28 +3059,28 @@
     </p:spTree>
     <p:extLst>
       <p:ext uri="{BB962C8B-B14F-4D97-AF65-F5344CB8AC3E}">
-        <p14:creationId xmlns:p14="http://schemas.microsoft.com/office/powerpoint/2010/main" val="2557711237"/>
+        <p14:creationId xmlns:p14="http://schemas.microsoft.com/office/powerpoint/2010/main" val="3368412053"/>
       </p:ext>
     </p:extLst>
   </p:cSld>
-  <p:clrMap bg1="dk1" tx1="lt1" bg2="dk2" tx2="lt2" accent1="accent1" accent2="accent2" accent3="accent3" accent4="accent4" accent5="accent5" accent6="accent6" hlink="hlink" folHlink="folHlink"/>
+  <p:clrMap bg1="lt1" tx1="dk1" bg2="lt2" tx2="dk2" accent1="accent1" accent2="accent2" accent3="accent3" accent4="accent4" accent5="accent5" accent6="accent6" hlink="hlink" folHlink="folHlink"/>
   <p:sldLayoutIdLst>
-    <p:sldLayoutId id="2147483649" r:id="rId1"/>
-    <p:sldLayoutId id="2147483650" r:id="rId2"/>
-    <p:sldLayoutId id="2147483651" r:id="rId3"/>
-    <p:sldLayoutId id="2147483652" r:id="rId4"/>
-    <p:sldLayoutId id="2147483653" r:id="rId5"/>
-    <p:sldLayoutId id="2147483654" r:id="rId6"/>
-    <p:sldLayoutId id="2147483655" r:id="rId7"/>
-    <p:sldLayoutId id="2147483656" r:id="rId8"/>
-    <p:sldLayoutId id="2147483657" r:id="rId9"/>
-    <p:sldLayoutId id="2147483658" r:id="rId10"/>
-    <p:sldLayoutId id="2147483659" r:id="rId11"/>
-    <p:sldLayoutId id="2147483660" r:id="rId12"/>
+    <p:sldLayoutId id="2147483662" r:id="rId1"/>
+    <p:sldLayoutId id="2147483663" r:id="rId2"/>
+    <p:sldLayoutId id="2147483664" r:id="rId3"/>
+    <p:sldLayoutId id="2147483665" r:id="rId4"/>
+    <p:sldLayoutId id="2147483666" r:id="rId5"/>
+    <p:sldLayoutId id="2147483667" r:id="rId6"/>
+    <p:sldLayoutId id="2147483668" r:id="rId7"/>
+    <p:sldLayoutId id="2147483669" r:id="rId8"/>
+    <p:sldLayoutId id="2147483670" r:id="rId9"/>
+    <p:sldLayoutId id="2147483671" r:id="rId10"/>
+    <p:sldLayoutId id="2147483672" r:id="rId11"/>
+    <p:sldLayoutId id="2147483673" r:id="rId12"/>
   </p:sldLayoutIdLst>
   <p:txStyles>
     <p:titleStyle>
-      <a:lvl1pPr algn="ctr" defTabSz="914400" rtl="0" eaLnBrk="1" latinLnBrk="0" hangingPunct="1">
+      <a:lvl1pPr algn="ctr" defTabSz="457200" rtl="0" eaLnBrk="1" latinLnBrk="0" hangingPunct="1">
         <a:spcBef>
           <a:spcPct val="0"/>
         </a:spcBef>
@@ -3099,11 +3096,11 @@
       </a:lvl1pPr>
     </p:titleStyle>
     <p:bodyStyle>
-      <a:lvl1pPr marL="342900" indent="-342900" algn="l" defTabSz="914400" rtl="0" eaLnBrk="1" latinLnBrk="0" hangingPunct="1">
+      <a:lvl1pPr marL="342900" indent="-342900" algn="l" defTabSz="457200" rtl="0" eaLnBrk="1" latinLnBrk="0" hangingPunct="1">
         <a:spcBef>
           <a:spcPct val="20000"/>
         </a:spcBef>
-        <a:buFont typeface="Arial" pitchFamily="34" charset="0"/>
+        <a:buFont typeface="Arial"/>
         <a:buChar char="•"/>
         <a:defRPr sz="3200" kern="1200">
           <a:solidFill>
@@ -3114,11 +3111,11 @@
           <a:cs typeface="+mn-cs"/>
         </a:defRPr>
       </a:lvl1pPr>
-      <a:lvl2pPr marL="742950" indent="-285750" algn="l" defTabSz="914400" rtl="0" eaLnBrk="1" latinLnBrk="0" hangingPunct="1">
+      <a:lvl2pPr marL="742950" indent="-285750" algn="l" defTabSz="457200" rtl="0" eaLnBrk="1" latinLnBrk="0" hangingPunct="1">
         <a:spcBef>
           <a:spcPct val="20000"/>
         </a:spcBef>
-        <a:buFont typeface="Arial" pitchFamily="34" charset="0"/>
+        <a:buFont typeface="Arial"/>
         <a:buChar char="–"/>
         <a:defRPr sz="2800" kern="1200">
           <a:solidFill>
@@ -3129,11 +3126,11 @@
           <a:cs typeface="+mn-cs"/>
         </a:defRPr>
       </a:lvl2pPr>
-      <a:lvl3pPr marL="1143000" indent="-228600" algn="l" defTabSz="914400" rtl="0" eaLnBrk="1" latinLnBrk="0" hangingPunct="1">
+      <a:lvl3pPr marL="1143000" indent="-228600" algn="l" defTabSz="457200" rtl="0" eaLnBrk="1" latinLnBrk="0" hangingPunct="1">
         <a:spcBef>
           <a:spcPct val="20000"/>
         </a:spcBef>
-        <a:buFont typeface="Arial" pitchFamily="34" charset="0"/>
+        <a:buFont typeface="Arial"/>
         <a:buChar char="•"/>
         <a:defRPr sz="2400" kern="1200">
           <a:solidFill>
@@ -3144,11 +3141,11 @@
           <a:cs typeface="+mn-cs"/>
         </a:defRPr>
       </a:lvl3pPr>
-      <a:lvl4pPr marL="1600200" indent="-228600" algn="l" defTabSz="914400" rtl="0" eaLnBrk="1" latinLnBrk="0" hangingPunct="1">
+      <a:lvl4pPr marL="1600200" indent="-228600" algn="l" defTabSz="457200" rtl="0" eaLnBrk="1" latinLnBrk="0" hangingPunct="1">
         <a:spcBef>
           <a:spcPct val="20000"/>
         </a:spcBef>
-        <a:buFont typeface="Arial" pitchFamily="34" charset="0"/>
+        <a:buFont typeface="Arial"/>
         <a:buChar char="–"/>
         <a:defRPr sz="2000" kern="1200">
           <a:solidFill>
@@ -3159,11 +3156,11 @@
           <a:cs typeface="+mn-cs"/>
         </a:defRPr>
       </a:lvl4pPr>
-      <a:lvl5pPr marL="2057400" indent="-228600" algn="l" defTabSz="914400" rtl="0" eaLnBrk="1" latinLnBrk="0" hangingPunct="1">
+      <a:lvl5pPr marL="2057400" indent="-228600" algn="l" defTabSz="457200" rtl="0" eaLnBrk="1" latinLnBrk="0" hangingPunct="1">
         <a:spcBef>
           <a:spcPct val="20000"/>
         </a:spcBef>
-        <a:buFont typeface="Arial" pitchFamily="34" charset="0"/>
+        <a:buFont typeface="Arial"/>
         <a:buChar char="»"/>
         <a:defRPr sz="2000" kern="1200">
           <a:solidFill>
@@ -3174,11 +3171,11 @@
           <a:cs typeface="+mn-cs"/>
         </a:defRPr>
       </a:lvl5pPr>
-      <a:lvl6pPr marL="2514600" indent="-228600" algn="l" defTabSz="914400" rtl="0" eaLnBrk="1" latinLnBrk="0" hangingPunct="1">
+      <a:lvl6pPr marL="2514600" indent="-228600" algn="l" defTabSz="457200" rtl="0" eaLnBrk="1" latinLnBrk="0" hangingPunct="1">
         <a:spcBef>
           <a:spcPct val="20000"/>
         </a:spcBef>
-        <a:buFont typeface="Arial" pitchFamily="34" charset="0"/>
+        <a:buFont typeface="Arial"/>
         <a:buChar char="•"/>
         <a:defRPr sz="2000" kern="1200">
           <a:solidFill>
@@ -3189,11 +3186,11 @@
           <a:cs typeface="+mn-cs"/>
         </a:defRPr>
       </a:lvl6pPr>
-      <a:lvl7pPr marL="2971800" indent="-228600" algn="l" defTabSz="914400" rtl="0" eaLnBrk="1" latinLnBrk="0" hangingPunct="1">
+      <a:lvl7pPr marL="2971800" indent="-228600" algn="l" defTabSz="457200" rtl="0" eaLnBrk="1" latinLnBrk="0" hangingPunct="1">
         <a:spcBef>
           <a:spcPct val="20000"/>
         </a:spcBef>
-        <a:buFont typeface="Arial" pitchFamily="34" charset="0"/>
+        <a:buFont typeface="Arial"/>
         <a:buChar char="•"/>
         <a:defRPr sz="2000" kern="1200">
           <a:solidFill>
@@ -3204,11 +3201,11 @@
           <a:cs typeface="+mn-cs"/>
         </a:defRPr>
       </a:lvl7pPr>
-      <a:lvl8pPr marL="3429000" indent="-228600" algn="l" defTabSz="914400" rtl="0" eaLnBrk="1" latinLnBrk="0" hangingPunct="1">
+      <a:lvl8pPr marL="3429000" indent="-228600" algn="l" defTabSz="457200" rtl="0" eaLnBrk="1" latinLnBrk="0" hangingPunct="1">
         <a:spcBef>
           <a:spcPct val="20000"/>
         </a:spcBef>
-        <a:buFont typeface="Arial" pitchFamily="34" charset="0"/>
+        <a:buFont typeface="Arial"/>
         <a:buChar char="•"/>
         <a:defRPr sz="2000" kern="1200">
           <a:solidFill>
@@ -3219,11 +3216,11 @@
           <a:cs typeface="+mn-cs"/>
         </a:defRPr>
       </a:lvl8pPr>
-      <a:lvl9pPr marL="3886200" indent="-228600" algn="l" defTabSz="914400" rtl="0" eaLnBrk="1" latinLnBrk="0" hangingPunct="1">
+      <a:lvl9pPr marL="3886200" indent="-228600" algn="l" defTabSz="457200" rtl="0" eaLnBrk="1" latinLnBrk="0" hangingPunct="1">
         <a:spcBef>
           <a:spcPct val="20000"/>
         </a:spcBef>
-        <a:buFont typeface="Arial" pitchFamily="34" charset="0"/>
+        <a:buFont typeface="Arial"/>
         <a:buChar char="•"/>
         <a:defRPr sz="2000" kern="1200">
           <a:solidFill>
@@ -3239,7 +3236,7 @@
       <a:defPPr>
         <a:defRPr lang="en-US"/>
       </a:defPPr>
-      <a:lvl1pPr marL="0" algn="l" defTabSz="914400" rtl="0" eaLnBrk="1" latinLnBrk="0" hangingPunct="1">
+      <a:lvl1pPr marL="0" algn="l" defTabSz="457200" rtl="0" eaLnBrk="1" latinLnBrk="0" hangingPunct="1">
         <a:defRPr sz="1800" kern="1200">
           <a:solidFill>
             <a:schemeClr val="tx1"/>
@@ -3249,7 +3246,7 @@
           <a:cs typeface="+mn-cs"/>
         </a:defRPr>
       </a:lvl1pPr>
-      <a:lvl2pPr marL="457200" algn="l" defTabSz="914400" rtl="0" eaLnBrk="1" latinLnBrk="0" hangingPunct="1">
+      <a:lvl2pPr marL="457200" algn="l" defTabSz="457200" rtl="0" eaLnBrk="1" latinLnBrk="0" hangingPunct="1">
         <a:defRPr sz="1800" kern="1200">
           <a:solidFill>
             <a:schemeClr val="tx1"/>
@@ -3259,7 +3256,7 @@
           <a:cs typeface="+mn-cs"/>
         </a:defRPr>
       </a:lvl2pPr>
-      <a:lvl3pPr marL="914400" algn="l" defTabSz="914400" rtl="0" eaLnBrk="1" latinLnBrk="0" hangingPunct="1">
+      <a:lvl3pPr marL="914400" algn="l" defTabSz="457200" rtl="0" eaLnBrk="1" latinLnBrk="0" hangingPunct="1">
         <a:defRPr sz="1800" kern="1200">
           <a:solidFill>
             <a:schemeClr val="tx1"/>
@@ -3269,7 +3266,7 @@
           <a:cs typeface="+mn-cs"/>
         </a:defRPr>
       </a:lvl3pPr>
-      <a:lvl4pPr marL="1371600" algn="l" defTabSz="914400" rtl="0" eaLnBrk="1" latinLnBrk="0" hangingPunct="1">
+      <a:lvl4pPr marL="1371600" algn="l" defTabSz="457200" rtl="0" eaLnBrk="1" latinLnBrk="0" hangingPunct="1">
         <a:defRPr sz="1800" kern="1200">
           <a:solidFill>
             <a:schemeClr val="tx1"/>
@@ -3279,7 +3276,7 @@
           <a:cs typeface="+mn-cs"/>
         </a:defRPr>
       </a:lvl4pPr>
-      <a:lvl5pPr marL="1828800" algn="l" defTabSz="914400" rtl="0" eaLnBrk="1" latinLnBrk="0" hangingPunct="1">
+      <a:lvl5pPr marL="1828800" algn="l" defTabSz="457200" rtl="0" eaLnBrk="1" latinLnBrk="0" hangingPunct="1">
         <a:defRPr sz="1800" kern="1200">
           <a:solidFill>
             <a:schemeClr val="tx1"/>
@@ -3289,7 +3286,7 @@
           <a:cs typeface="+mn-cs"/>
         </a:defRPr>
       </a:lvl5pPr>
-      <a:lvl6pPr marL="2286000" algn="l" defTabSz="914400" rtl="0" eaLnBrk="1" latinLnBrk="0" hangingPunct="1">
+      <a:lvl6pPr marL="2286000" algn="l" defTabSz="457200" rtl="0" eaLnBrk="1" latinLnBrk="0" hangingPunct="1">
         <a:defRPr sz="1800" kern="1200">
           <a:solidFill>
             <a:schemeClr val="tx1"/>
@@ -3299,7 +3296,7 @@
           <a:cs typeface="+mn-cs"/>
         </a:defRPr>
       </a:lvl6pPr>
-      <a:lvl7pPr marL="2743200" algn="l" defTabSz="914400" rtl="0" eaLnBrk="1" latinLnBrk="0" hangingPunct="1">
+      <a:lvl7pPr marL="2743200" algn="l" defTabSz="457200" rtl="0" eaLnBrk="1" latinLnBrk="0" hangingPunct="1">
         <a:defRPr sz="1800" kern="1200">
           <a:solidFill>
             <a:schemeClr val="tx1"/>
@@ -3309,7 +3306,7 @@
           <a:cs typeface="+mn-cs"/>
         </a:defRPr>
       </a:lvl7pPr>
-      <a:lvl8pPr marL="3200400" algn="l" defTabSz="914400" rtl="0" eaLnBrk="1" latinLnBrk="0" hangingPunct="1">
+      <a:lvl8pPr marL="3200400" algn="l" defTabSz="457200" rtl="0" eaLnBrk="1" latinLnBrk="0" hangingPunct="1">
         <a:defRPr sz="1800" kern="1200">
           <a:solidFill>
             <a:schemeClr val="tx1"/>
@@ -3319,7 +3316,7 @@
           <a:cs typeface="+mn-cs"/>
         </a:defRPr>
       </a:lvl8pPr>
-      <a:lvl9pPr marL="3657600" algn="l" defTabSz="914400" rtl="0" eaLnBrk="1" latinLnBrk="0" hangingPunct="1">
+      <a:lvl9pPr marL="3657600" algn="l" defTabSz="457200" rtl="0" eaLnBrk="1" latinLnBrk="0" hangingPunct="1">
         <a:defRPr sz="1800" kern="1200">
           <a:solidFill>
             <a:schemeClr val="tx1"/>
@@ -4081,24 +4078,28 @@
           <a:p>
             <a:r>
               <a:rPr lang="en-US" dirty="0" smtClean="0"/>
-              <a:t>Keys is tempting </a:t>
-            </a:r>
+              <a:t>Keys is </a:t>
+            </a:r>
+            <a:r>
+              <a:rPr lang="en-US" dirty="0" smtClean="0"/>
+              <a:t>tempting… </a:t>
+            </a:r>
+            <a:r>
+              <a:rPr lang="en-US" dirty="0">
+                <a:sym typeface="Wingdings"/>
+              </a:rPr>
+              <a:t/>
+            </a:r>
+            <a:br>
+              <a:rPr lang="en-US" dirty="0">
+                <a:sym typeface="Wingdings"/>
+              </a:rPr>
+            </a:br>
             <a:r>
               <a:rPr lang="en-US" dirty="0" smtClean="0">
                 <a:sym typeface="Wingdings"/>
               </a:rPr>
-              <a:t></a:t>
-            </a:r>
-            <a:br>
-              <a:rPr lang="en-US" dirty="0" smtClean="0">
-                <a:sym typeface="Wingdings"/>
-              </a:rPr>
-            </a:br>
-            <a:r>
-              <a:rPr lang="en-US" dirty="0" smtClean="0">
-                <a:sym typeface="Wingdings"/>
-              </a:rPr>
-              <a:t>Use replication to grab a snapshot…</a:t>
+              <a:t>Keep replica(s) around for reporting </a:t>
             </a:r>
             <a:endParaRPr lang="en-US" dirty="0"/>
           </a:p>
@@ -4126,7 +4127,7 @@
         </p:blipFill>
         <p:spPr>
           <a:xfrm>
-            <a:off x="0" y="2231911"/>
+            <a:off x="0" y="2544652"/>
             <a:ext cx="9144000" cy="1934793"/>
           </a:xfrm>
           <a:prstGeom prst="rect">
@@ -4297,13 +4298,17 @@
             </a:r>
             <a:r>
               <a:rPr lang="en-US" dirty="0" smtClean="0"/>
-              <a:t> callbacks </a:t>
+              <a:t> </a:t>
+            </a:r>
+            <a:r>
+              <a:rPr lang="en-US" dirty="0" smtClean="0"/>
+              <a:t>callbacks</a:t>
             </a:r>
             <a:r>
               <a:rPr lang="en-US" dirty="0" smtClean="0">
                 <a:sym typeface="Wingdings"/>
               </a:rPr>
-              <a:t></a:t>
+              <a:t/>
             </a:r>
             <a:br>
               <a:rPr lang="en-US" dirty="0" smtClean="0">
@@ -4326,7 +4331,13 @@
               <a:rPr lang="en-US" dirty="0" smtClean="0">
                 <a:sym typeface="Wingdings"/>
               </a:rPr>
-              <a:t> instead…</a:t>
+              <a:t> </a:t>
+            </a:r>
+            <a:r>
+              <a:rPr lang="en-US" dirty="0" smtClean="0">
+                <a:sym typeface="Wingdings"/>
+              </a:rPr>
+              <a:t>instead </a:t>
             </a:r>
             <a:endParaRPr lang="en-US" dirty="0"/>
           </a:p>
@@ -4525,7 +4536,17 @@
             </a:r>
             <a:r>
               <a:rPr lang="en-US" dirty="0" smtClean="0"/>
-              <a:t> dropping data</a:t>
+              <a:t> </a:t>
+            </a:r>
+            <a:r>
+              <a:rPr lang="en-US" dirty="0" smtClean="0"/>
+              <a:t>not dropping data </a:t>
+            </a:r>
+            <a:r>
+              <a:rPr lang="en-US" dirty="0" smtClean="0">
+                <a:sym typeface="Wingdings"/>
+              </a:rPr>
+              <a:t></a:t>
             </a:r>
             <a:r>
               <a:rPr lang="en-US" dirty="0" smtClean="0">
@@ -4539,22 +4560,40 @@
               </a:rPr>
             </a:br>
             <a:r>
-              <a:rPr lang="en-US" dirty="0" smtClean="0">
+              <a:rPr lang="en-US" sz="3200" dirty="0" smtClean="0">
                 <a:sym typeface="Wingdings"/>
               </a:rPr>
-              <a:t>TODO: submit </a:t>
-            </a:r>
-            <a:r>
-              <a:rPr lang="en-US" dirty="0" err="1" smtClean="0">
+              <a:t>See: https://</a:t>
+            </a:r>
+            <a:r>
+              <a:rPr lang="en-US" sz="3200" dirty="0" err="1" smtClean="0">
                 <a:sym typeface="Wingdings"/>
               </a:rPr>
-              <a:t>rpoplpush</a:t>
-            </a:r>
-            <a:r>
-              <a:rPr lang="en-US" dirty="0" smtClean="0">
+              <a:t>github.com</a:t>
+            </a:r>
+            <a:r>
+              <a:rPr lang="en-US" sz="3200" dirty="0" smtClean="0">
                 <a:sym typeface="Wingdings"/>
               </a:rPr>
-              <a:t> patch </a:t>
+              <a:t>/</a:t>
+            </a:r>
+            <a:r>
+              <a:rPr lang="en-US" sz="3200" dirty="0" err="1" smtClean="0">
+                <a:sym typeface="Wingdings"/>
+              </a:rPr>
+              <a:t>redsquirrel</a:t>
+            </a:r>
+            <a:r>
+              <a:rPr lang="en-US" sz="3200" dirty="0" smtClean="0">
+                <a:sym typeface="Wingdings"/>
+              </a:rPr>
+              <a:t>/</a:t>
+            </a:r>
+            <a:r>
+              <a:rPr lang="en-US" sz="3200" dirty="0" err="1" smtClean="0">
+                <a:sym typeface="Wingdings"/>
+              </a:rPr>
+              <a:t>resque</a:t>
             </a:r>
             <a:endParaRPr lang="en-US" dirty="0"/>
           </a:p>
@@ -4562,28 +4601,22 @@
       </p:sp>
       <p:pic>
         <p:nvPicPr>
-          <p:cNvPr id="2" name="Picture 1" descr="09-resque-drops.rb-1.jpg"/>
+          <p:cNvPr id="4" name="Picture 3"/>
           <p:cNvPicPr>
             <a:picLocks noChangeAspect="1"/>
           </p:cNvPicPr>
           <p:nvPr/>
         </p:nvPicPr>
         <p:blipFill>
-          <a:blip r:embed="rId2">
-            <a:extLst>
-              <a:ext uri="{28A0092B-C50C-407E-A947-70E740481C1C}">
-                <a14:useLocalDpi xmlns:a14="http://schemas.microsoft.com/office/drawing/2010/main" val="0"/>
-              </a:ext>
-            </a:extLst>
-          </a:blip>
+          <a:blip r:embed="rId2"/>
           <a:stretch>
             <a:fillRect/>
           </a:stretch>
         </p:blipFill>
         <p:spPr>
           <a:xfrm>
-            <a:off x="0" y="2259922"/>
-            <a:ext cx="9144000" cy="3363310"/>
+            <a:off x="0" y="2134135"/>
+            <a:ext cx="9144000" cy="3615655"/>
           </a:xfrm>
           <a:prstGeom prst="rect">
             <a:avLst/>
@@ -4671,7 +4704,7 @@
         <p:spPr/>
         <p:txBody>
           <a:bodyPr>
-            <a:normAutofit lnSpcReduction="10000"/>
+            <a:normAutofit/>
           </a:bodyPr>
           <a:lstStyle/>
           <a:p>
@@ -4684,56 +4717,92 @@
             </a:r>
             <a:r>
               <a:rPr lang="en-US" dirty="0"/>
-              <a:t> is an open source, advanced key-value store</a:t>
+              <a:t> is an open source, advanced key-value </a:t>
             </a:r>
             <a:r>
               <a:rPr lang="en-US" dirty="0" smtClean="0"/>
-              <a:t>.</a:t>
-            </a:r>
-            <a:endParaRPr lang="en-US" dirty="0"/>
-          </a:p>
-          <a:p>
-            <a:pPr marL="0" indent="0">
-              <a:buNone/>
-            </a:pPr>
-            <a:endParaRPr lang="en-US" dirty="0" smtClean="0"/>
-          </a:p>
-          <a:p>
-            <a:pPr marL="0" indent="0">
-              <a:buNone/>
-            </a:pPr>
+              <a:t>store.</a:t>
+            </a:r>
             <a:r>
               <a:rPr lang="en-US" dirty="0"/>
-              <a:t>It is often referred to as a data structure server since keys can contain strings, hashes, lists, sets and sorted sets</a:t>
+              <a:t> </a:t>
             </a:r>
             <a:r>
               <a:rPr lang="en-US" dirty="0" smtClean="0"/>
-              <a:t>.</a:t>
-            </a:r>
-          </a:p>
-          <a:p>
-            <a:pPr marL="0" indent="0">
-              <a:buNone/>
-            </a:pPr>
-            <a:endParaRPr lang="en-US" sz="2000" dirty="0" smtClean="0">
-              <a:solidFill>
-                <a:schemeClr val="tx1">
-                  <a:lumMod val="75000"/>
-                </a:schemeClr>
-              </a:solidFill>
-            </a:endParaRPr>
-          </a:p>
-          <a:p>
-            <a:pPr marL="0" indent="0">
-              <a:buNone/>
-            </a:pPr>
-            <a:endParaRPr lang="en-US" sz="2000" dirty="0" smtClean="0">
-              <a:solidFill>
-                <a:schemeClr val="tx1">
-                  <a:lumMod val="75000"/>
-                </a:schemeClr>
-              </a:solidFill>
-            </a:endParaRPr>
+              <a:t>… </a:t>
+            </a:r>
+            <a:r>
+              <a:rPr lang="en-US" dirty="0" smtClean="0"/>
+              <a:t>It </a:t>
+            </a:r>
+            <a:r>
+              <a:rPr lang="en-US" dirty="0"/>
+              <a:t>is often referred to as a data structure server since keys can contain strings, hashes, lists, sets and sorted sets</a:t>
+            </a:r>
+            <a:r>
+              <a:rPr lang="en-US" dirty="0" smtClean="0"/>
+              <a:t>.  </a:t>
+            </a:r>
+            <a:r>
+              <a:rPr lang="en-US" sz="1600" dirty="0" smtClean="0">
+                <a:solidFill>
+                  <a:schemeClr val="tx1">
+                    <a:lumMod val="75000"/>
+                  </a:schemeClr>
+                </a:solidFill>
+              </a:rPr>
+              <a:t>(</a:t>
+            </a:r>
+            <a:r>
+              <a:rPr lang="en-US" sz="1600" dirty="0" smtClean="0">
+                <a:solidFill>
+                  <a:schemeClr val="tx1">
+                    <a:lumMod val="75000"/>
+                  </a:schemeClr>
+                </a:solidFill>
+              </a:rPr>
+              <a:t>copy &amp; pasted </a:t>
+            </a:r>
+            <a:r>
+              <a:rPr lang="en-US" sz="1600" dirty="0" smtClean="0">
+                <a:solidFill>
+                  <a:schemeClr val="tx1">
+                    <a:lumMod val="75000"/>
+                  </a:schemeClr>
+                </a:solidFill>
+              </a:rPr>
+              <a:t>from </a:t>
+            </a:r>
+            <a:r>
+              <a:rPr lang="en-US" sz="1600" dirty="0" smtClean="0">
+                <a:solidFill>
+                  <a:schemeClr val="tx1">
+                    <a:lumMod val="75000"/>
+                  </a:schemeClr>
+                </a:solidFill>
+              </a:rPr>
+              <a:t>http://</a:t>
+            </a:r>
+            <a:r>
+              <a:rPr lang="en-US" sz="1600" dirty="0" err="1" smtClean="0">
+                <a:solidFill>
+                  <a:schemeClr val="tx1">
+                    <a:lumMod val="75000"/>
+                  </a:schemeClr>
+                </a:solidFill>
+              </a:rPr>
+              <a:t>redis.io</a:t>
+            </a:r>
+            <a:r>
+              <a:rPr lang="en-US" sz="1600" dirty="0" smtClean="0">
+                <a:solidFill>
+                  <a:schemeClr val="tx1">
+                    <a:lumMod val="75000"/>
+                  </a:schemeClr>
+                </a:solidFill>
+              </a:rPr>
+              <a:t>)</a:t>
+            </a:r>
           </a:p>
           <a:p>
             <a:pPr marL="0" indent="0">
@@ -4751,11 +4820,9 @@
             <a:pPr marL="0" indent="0">
               <a:buNone/>
             </a:pPr>
-            <a:endParaRPr lang="en-US" sz="1600" dirty="0">
+            <a:endParaRPr lang="en-US" dirty="0" smtClean="0">
               <a:solidFill>
-                <a:schemeClr val="tx1">
-                  <a:lumMod val="75000"/>
-                </a:schemeClr>
+                <a:prstClr val="white"/>
               </a:solidFill>
             </a:endParaRPr>
           </a:p>
@@ -4764,35 +4831,46 @@
               <a:buNone/>
             </a:pPr>
             <a:r>
-              <a:rPr lang="en-US" sz="1600" dirty="0" smtClean="0">
-                <a:solidFill>
-                  <a:schemeClr val="tx1">
-                    <a:lumMod val="75000"/>
-                  </a:schemeClr>
-                </a:solidFill>
-              </a:rPr>
-              <a:t>(copy &amp; pasted from http://</a:t>
-            </a:r>
-            <a:r>
-              <a:rPr lang="en-US" sz="1600" dirty="0" err="1" smtClean="0">
-                <a:solidFill>
-                  <a:schemeClr val="tx1">
-                    <a:lumMod val="75000"/>
-                  </a:schemeClr>
-                </a:solidFill>
-              </a:rPr>
-              <a:t>redis.io</a:t>
-            </a:r>
-            <a:r>
-              <a:rPr lang="en-US" sz="1600" dirty="0">
-                <a:solidFill>
-                  <a:schemeClr val="tx1">
-                    <a:lumMod val="75000"/>
-                  </a:schemeClr>
-                </a:solidFill>
-              </a:rPr>
-              <a:t>)</a:t>
-            </a:r>
+              <a:rPr lang="en-US" dirty="0" err="1" smtClean="0"/>
+              <a:t>Redis</a:t>
+            </a:r>
+            <a:r>
+              <a:rPr lang="en-US" dirty="0" smtClean="0"/>
+              <a:t> == </a:t>
+            </a:r>
+            <a:r>
+              <a:rPr lang="en-US" b="1" i="1" dirty="0" err="1" smtClean="0"/>
+              <a:t>RE</a:t>
+            </a:r>
+            <a:r>
+              <a:rPr lang="en-US" dirty="0" err="1" smtClean="0"/>
+              <a:t>mote</a:t>
+            </a:r>
+            <a:r>
+              <a:rPr lang="en-US" dirty="0" smtClean="0"/>
+              <a:t> </a:t>
+            </a:r>
+            <a:r>
+              <a:rPr lang="en-US" b="1" i="1" dirty="0" err="1" smtClean="0"/>
+              <a:t>DI</a:t>
+            </a:r>
+            <a:r>
+              <a:rPr lang="en-US" dirty="0" err="1" smtClean="0"/>
+              <a:t>ctionary</a:t>
+            </a:r>
+            <a:r>
+              <a:rPr lang="en-US" dirty="0" smtClean="0"/>
+              <a:t> </a:t>
+            </a:r>
+            <a:r>
+              <a:rPr lang="en-US" b="1" i="1" dirty="0" smtClean="0"/>
+              <a:t>S</a:t>
+            </a:r>
+            <a:r>
+              <a:rPr lang="en-US" dirty="0" smtClean="0"/>
+              <a:t>erver</a:t>
+            </a:r>
+            <a:endParaRPr lang="en-US" sz="1600" dirty="0"/>
           </a:p>
         </p:txBody>
       </p:sp>
@@ -4964,28 +5042,22 @@
       </p:sp>
       <p:pic>
         <p:nvPicPr>
-          <p:cNvPr id="7" name="Picture 6" descr="10-pseudo_redis.rb-2.jpg"/>
+          <p:cNvPr id="3" name="Picture 2"/>
           <p:cNvPicPr>
             <a:picLocks noChangeAspect="1"/>
           </p:cNvPicPr>
           <p:nvPr/>
         </p:nvPicPr>
         <p:blipFill>
-          <a:blip r:embed="rId2">
-            <a:extLst>
-              <a:ext uri="{28A0092B-C50C-407E-A947-70E740481C1C}">
-                <a14:useLocalDpi xmlns:a14="http://schemas.microsoft.com/office/drawing/2010/main" val="0"/>
-              </a:ext>
-            </a:extLst>
-          </a:blip>
+          <a:blip r:embed="rId2"/>
           <a:stretch>
             <a:fillRect/>
           </a:stretch>
         </p:blipFill>
         <p:spPr>
           <a:xfrm>
-            <a:off x="0" y="1417638"/>
-            <a:ext cx="9144000" cy="4267200"/>
+            <a:off x="0" y="1657405"/>
+            <a:ext cx="9144000" cy="4758721"/>
           </a:xfrm>
           <a:prstGeom prst="rect">
             <a:avLst/>
@@ -5046,15 +5118,7 @@
           <a:p>
             <a:r>
               <a:rPr lang="en-US" dirty="0" smtClean="0"/>
-              <a:t>How are we </a:t>
-            </a:r>
-            <a:r>
-              <a:rPr lang="en-US" i="1" dirty="0" smtClean="0"/>
-              <a:t>using</a:t>
-            </a:r>
-            <a:r>
-              <a:rPr lang="en-US" dirty="0" smtClean="0"/>
-              <a:t> </a:t>
+              <a:t>How are we using </a:t>
             </a:r>
             <a:r>
               <a:rPr lang="en-US" dirty="0" err="1" smtClean="0"/>
@@ -5471,6 +5535,439 @@
           <a:p>
             <a:r>
               <a:rPr lang="en-US" dirty="0" smtClean="0"/>
+              <a:t>What hav</a:t>
+            </a:r>
+            <a:r>
+              <a:rPr lang="en-US" dirty="0" smtClean="0"/>
+              <a:t>e we learned?</a:t>
+            </a:r>
+            <a:endParaRPr lang="en-US" dirty="0"/>
+          </a:p>
+        </p:txBody>
+      </p:sp>
+      <p:sp>
+        <p:nvSpPr>
+          <p:cNvPr id="3" name="Rectangle 1"/>
+          <p:cNvSpPr txBox="1">
+            <a:spLocks noChangeArrowheads="1"/>
+          </p:cNvSpPr>
+          <p:nvPr/>
+        </p:nvSpPr>
+        <p:spPr>
+          <a:xfrm>
+            <a:off x="-334202" y="1665890"/>
+            <a:ext cx="9405394" cy="5008307"/>
+          </a:xfrm>
+          <a:prstGeom prst="rect">
+            <a:avLst/>
+          </a:prstGeom>
+        </p:spPr>
+        <p:txBody>
+          <a:bodyPr vert="horz" lIns="91440" tIns="45720" rIns="91440" bIns="45720" rtlCol="0">
+            <a:normAutofit/>
+          </a:bodyPr>
+          <a:lstStyle>
+            <a:lvl1pPr marL="342900" indent="-342900" algn="l" defTabSz="914400" rtl="0" eaLnBrk="1" latinLnBrk="0" hangingPunct="1">
+              <a:spcBef>
+                <a:spcPct val="20000"/>
+              </a:spcBef>
+              <a:buFont typeface="Arial" pitchFamily="34" charset="0"/>
+              <a:buChar char="•"/>
+              <a:defRPr sz="3200" kern="1200">
+                <a:solidFill>
+                  <a:schemeClr val="tx1"/>
+                </a:solidFill>
+                <a:latin typeface="+mn-lt"/>
+                <a:ea typeface="+mn-ea"/>
+                <a:cs typeface="+mn-cs"/>
+              </a:defRPr>
+            </a:lvl1pPr>
+            <a:lvl2pPr marL="742950" indent="-285750" algn="l" defTabSz="914400" rtl="0" eaLnBrk="1" latinLnBrk="0" hangingPunct="1">
+              <a:spcBef>
+                <a:spcPct val="20000"/>
+              </a:spcBef>
+              <a:buFont typeface="Arial" pitchFamily="34" charset="0"/>
+              <a:buChar char="–"/>
+              <a:defRPr sz="2800" kern="1200">
+                <a:solidFill>
+                  <a:schemeClr val="tx1"/>
+                </a:solidFill>
+                <a:latin typeface="+mn-lt"/>
+                <a:ea typeface="+mn-ea"/>
+                <a:cs typeface="+mn-cs"/>
+              </a:defRPr>
+            </a:lvl2pPr>
+            <a:lvl3pPr marL="1143000" indent="-228600" algn="l" defTabSz="914400" rtl="0" eaLnBrk="1" latinLnBrk="0" hangingPunct="1">
+              <a:spcBef>
+                <a:spcPct val="20000"/>
+              </a:spcBef>
+              <a:buFont typeface="Arial" pitchFamily="34" charset="0"/>
+              <a:buChar char="•"/>
+              <a:defRPr sz="2400" kern="1200">
+                <a:solidFill>
+                  <a:schemeClr val="tx1"/>
+                </a:solidFill>
+                <a:latin typeface="+mn-lt"/>
+                <a:ea typeface="+mn-ea"/>
+                <a:cs typeface="+mn-cs"/>
+              </a:defRPr>
+            </a:lvl3pPr>
+            <a:lvl4pPr marL="1600200" indent="-228600" algn="l" defTabSz="914400" rtl="0" eaLnBrk="1" latinLnBrk="0" hangingPunct="1">
+              <a:spcBef>
+                <a:spcPct val="20000"/>
+              </a:spcBef>
+              <a:buFont typeface="Arial" pitchFamily="34" charset="0"/>
+              <a:buChar char="–"/>
+              <a:defRPr sz="2000" kern="1200">
+                <a:solidFill>
+                  <a:schemeClr val="tx1"/>
+                </a:solidFill>
+                <a:latin typeface="+mn-lt"/>
+                <a:ea typeface="+mn-ea"/>
+                <a:cs typeface="+mn-cs"/>
+              </a:defRPr>
+            </a:lvl4pPr>
+            <a:lvl5pPr marL="2057400" indent="-228600" algn="l" defTabSz="914400" rtl="0" eaLnBrk="1" latinLnBrk="0" hangingPunct="1">
+              <a:spcBef>
+                <a:spcPct val="20000"/>
+              </a:spcBef>
+              <a:buFont typeface="Arial" pitchFamily="34" charset="0"/>
+              <a:buChar char="»"/>
+              <a:defRPr sz="2000" kern="1200">
+                <a:solidFill>
+                  <a:schemeClr val="tx1"/>
+                </a:solidFill>
+                <a:latin typeface="+mn-lt"/>
+                <a:ea typeface="+mn-ea"/>
+                <a:cs typeface="+mn-cs"/>
+              </a:defRPr>
+            </a:lvl5pPr>
+            <a:lvl6pPr marL="2514600" indent="-228600" algn="l" defTabSz="914400" rtl="0" eaLnBrk="1" latinLnBrk="0" hangingPunct="1">
+              <a:spcBef>
+                <a:spcPct val="20000"/>
+              </a:spcBef>
+              <a:buFont typeface="Arial" pitchFamily="34" charset="0"/>
+              <a:buChar char="•"/>
+              <a:defRPr sz="2000" kern="1200">
+                <a:solidFill>
+                  <a:schemeClr val="tx1"/>
+                </a:solidFill>
+                <a:latin typeface="+mn-lt"/>
+                <a:ea typeface="+mn-ea"/>
+                <a:cs typeface="+mn-cs"/>
+              </a:defRPr>
+            </a:lvl6pPr>
+            <a:lvl7pPr marL="2971800" indent="-228600" algn="l" defTabSz="914400" rtl="0" eaLnBrk="1" latinLnBrk="0" hangingPunct="1">
+              <a:spcBef>
+                <a:spcPct val="20000"/>
+              </a:spcBef>
+              <a:buFont typeface="Arial" pitchFamily="34" charset="0"/>
+              <a:buChar char="•"/>
+              <a:defRPr sz="2000" kern="1200">
+                <a:solidFill>
+                  <a:schemeClr val="tx1"/>
+                </a:solidFill>
+                <a:latin typeface="+mn-lt"/>
+                <a:ea typeface="+mn-ea"/>
+                <a:cs typeface="+mn-cs"/>
+              </a:defRPr>
+            </a:lvl7pPr>
+            <a:lvl8pPr marL="3429000" indent="-228600" algn="l" defTabSz="914400" rtl="0" eaLnBrk="1" latinLnBrk="0" hangingPunct="1">
+              <a:spcBef>
+                <a:spcPct val="20000"/>
+              </a:spcBef>
+              <a:buFont typeface="Arial" pitchFamily="34" charset="0"/>
+              <a:buChar char="•"/>
+              <a:defRPr sz="2000" kern="1200">
+                <a:solidFill>
+                  <a:schemeClr val="tx1"/>
+                </a:solidFill>
+                <a:latin typeface="+mn-lt"/>
+                <a:ea typeface="+mn-ea"/>
+                <a:cs typeface="+mn-cs"/>
+              </a:defRPr>
+            </a:lvl8pPr>
+            <a:lvl9pPr marL="3886200" indent="-228600" algn="l" defTabSz="914400" rtl="0" eaLnBrk="1" latinLnBrk="0" hangingPunct="1">
+              <a:spcBef>
+                <a:spcPct val="20000"/>
+              </a:spcBef>
+              <a:buFont typeface="Arial" pitchFamily="34" charset="0"/>
+              <a:buChar char="•"/>
+              <a:defRPr sz="2000" kern="1200">
+                <a:solidFill>
+                  <a:schemeClr val="tx1"/>
+                </a:solidFill>
+                <a:latin typeface="+mn-lt"/>
+                <a:ea typeface="+mn-ea"/>
+                <a:cs typeface="+mn-cs"/>
+              </a:defRPr>
+            </a:lvl9pPr>
+          </a:lstStyle>
+          <a:p>
+            <a:pPr marL="889000">
+              <a:buFont typeface="Lucida Grande" charset="0"/>
+              <a:buChar char="✓"/>
+              <a:defRPr/>
+            </a:pPr>
+            <a:r>
+              <a:rPr lang="en-US" b="1" dirty="0" smtClean="0"/>
+              <a:t> </a:t>
+            </a:r>
+            <a:r>
+              <a:rPr lang="en-US" dirty="0" smtClean="0"/>
+              <a:t>Start with </a:t>
+            </a:r>
+            <a:r>
+              <a:rPr lang="en-US" b="1" dirty="0" err="1" smtClean="0"/>
+              <a:t>expireat</a:t>
+            </a:r>
+            <a:r>
+              <a:rPr lang="en-US" dirty="0" smtClean="0"/>
+              <a:t>. Do we need this forever?</a:t>
+            </a:r>
+          </a:p>
+          <a:p>
+            <a:pPr marL="889000">
+              <a:buFont typeface="Lucida Grande" charset="0"/>
+              <a:buChar char="✓"/>
+              <a:defRPr/>
+            </a:pPr>
+            <a:r>
+              <a:rPr lang="en-US" dirty="0" smtClean="0"/>
+              <a:t> Start with </a:t>
+            </a:r>
+            <a:r>
+              <a:rPr lang="en-US" b="1" dirty="0" err="1" smtClean="0"/>
+              <a:t>slaveof</a:t>
+            </a:r>
+            <a:r>
+              <a:rPr lang="en-US" dirty="0" smtClean="0"/>
+              <a:t>. Keep a replica or two around.</a:t>
+            </a:r>
+            <a:endParaRPr lang="en-US" dirty="0" smtClean="0"/>
+          </a:p>
+          <a:p>
+            <a:pPr marL="889000">
+              <a:buFont typeface="Lucida Grande" charset="0"/>
+              <a:buChar char="✓"/>
+              <a:defRPr/>
+            </a:pPr>
+            <a:r>
+              <a:rPr lang="en-US" dirty="0" smtClean="0"/>
+              <a:t> </a:t>
+            </a:r>
+            <a:r>
+              <a:rPr lang="en-US" dirty="0" smtClean="0"/>
+              <a:t>Upgrade to 2.4.6 made </a:t>
+            </a:r>
+            <a:r>
+              <a:rPr lang="en-US" b="1" dirty="0" err="1" smtClean="0"/>
+              <a:t>hset</a:t>
+            </a:r>
+            <a:r>
+              <a:rPr lang="en-US" b="1" dirty="0" smtClean="0"/>
+              <a:t>/</a:t>
+            </a:r>
+            <a:r>
+              <a:rPr lang="en-US" b="1" dirty="0" err="1" smtClean="0"/>
+              <a:t>hgetall</a:t>
+            </a:r>
+            <a:r>
+              <a:rPr lang="en-US" dirty="0"/>
+              <a:t> </a:t>
+            </a:r>
+            <a:r>
+              <a:rPr lang="en-US" dirty="0" err="1" smtClean="0"/>
+              <a:t>performant</a:t>
+            </a:r>
+            <a:r>
+              <a:rPr lang="en-US" dirty="0" smtClean="0"/>
+              <a:t>.</a:t>
+            </a:r>
+            <a:endParaRPr lang="en-US" dirty="0" smtClean="0"/>
+          </a:p>
+          <a:p>
+            <a:pPr marL="889000">
+              <a:buFont typeface="Lucida Grande" charset="0"/>
+              <a:buChar char="✓"/>
+              <a:defRPr/>
+            </a:pPr>
+            <a:r>
+              <a:rPr lang="en-US" b="1" dirty="0" smtClean="0"/>
+              <a:t> </a:t>
+            </a:r>
+            <a:r>
+              <a:rPr lang="en-US" dirty="0" err="1" smtClean="0"/>
+              <a:t>Resque</a:t>
+            </a:r>
+            <a:r>
+              <a:rPr lang="en-US" dirty="0" smtClean="0"/>
+              <a:t> </a:t>
+            </a:r>
+            <a:r>
+              <a:rPr lang="en-US" dirty="0" smtClean="0"/>
+              <a:t>can’t be entirely trusted (see fork).</a:t>
+            </a:r>
+            <a:endParaRPr lang="en-US" dirty="0" smtClean="0"/>
+          </a:p>
+          <a:p>
+            <a:pPr marL="889000">
+              <a:buFont typeface="Lucida Grande" charset="0"/>
+              <a:buChar char="✓"/>
+              <a:defRPr/>
+            </a:pPr>
+            <a:r>
+              <a:rPr lang="en-US" b="1" dirty="0" smtClean="0"/>
+              <a:t> </a:t>
+            </a:r>
+            <a:r>
+              <a:rPr lang="en-US" dirty="0" err="1" smtClean="0"/>
+              <a:t>Redis</a:t>
+            </a:r>
+            <a:r>
+              <a:rPr lang="en-US" dirty="0" smtClean="0"/>
+              <a:t> Cluster is still a ways off, so </a:t>
+            </a:r>
+            <a:r>
+              <a:rPr lang="en-US" b="1" i="1" dirty="0" smtClean="0"/>
+              <a:t>PRESHARD</a:t>
+            </a:r>
+            <a:r>
+              <a:rPr lang="en-US" dirty="0" smtClean="0"/>
+              <a:t>.</a:t>
+            </a:r>
+            <a:endParaRPr lang="en-US" dirty="0"/>
+          </a:p>
+          <a:p>
+            <a:pPr marL="889000">
+              <a:buFont typeface="Lucida Grande" charset="0"/>
+              <a:buChar char="✓"/>
+              <a:defRPr/>
+            </a:pPr>
+            <a:r>
+              <a:rPr lang="en-US" b="1" dirty="0" smtClean="0"/>
+              <a:t> </a:t>
+            </a:r>
+            <a:r>
+              <a:rPr lang="en-US" dirty="0" smtClean="0"/>
+              <a:t>Use </a:t>
+            </a:r>
+            <a:r>
+              <a:rPr lang="en-US" dirty="0" err="1" smtClean="0"/>
+              <a:t>Redis</a:t>
+            </a:r>
+            <a:r>
+              <a:rPr lang="en-US" dirty="0" smtClean="0"/>
+              <a:t> when you want its data structures.</a:t>
+            </a:r>
+          </a:p>
+          <a:p>
+            <a:pPr marL="889000">
+              <a:buFont typeface="Lucida Grande" charset="0"/>
+              <a:buChar char="✓"/>
+              <a:defRPr/>
+            </a:pPr>
+            <a:r>
+              <a:rPr lang="en-US" dirty="0" smtClean="0"/>
+              <a:t> </a:t>
+            </a:r>
+            <a:r>
+              <a:rPr lang="en-US" b="1" dirty="0" err="1" smtClean="0"/>
+              <a:t>resque</a:t>
+            </a:r>
+            <a:r>
+              <a:rPr lang="en-US" b="1" dirty="0" smtClean="0"/>
+              <a:t>-jobs-per-fork</a:t>
+            </a:r>
+            <a:r>
+              <a:rPr lang="en-US" dirty="0" smtClean="0"/>
+              <a:t> has a nasty bug (fixed).</a:t>
+            </a:r>
+          </a:p>
+          <a:p>
+            <a:pPr marL="889000">
+              <a:buFont typeface="Lucida Grande" charset="0"/>
+              <a:buChar char="✓"/>
+              <a:defRPr/>
+            </a:pPr>
+            <a:r>
+              <a:rPr lang="en-US" b="1" dirty="0"/>
+              <a:t> </a:t>
+            </a:r>
+            <a:r>
+              <a:rPr lang="en-US" dirty="0" smtClean="0"/>
+              <a:t>Use </a:t>
+            </a:r>
+            <a:r>
+              <a:rPr lang="en-US" b="1" dirty="0" err="1" smtClean="0"/>
+              <a:t>fakeredis</a:t>
+            </a:r>
+            <a:r>
+              <a:rPr lang="en-US" b="1" dirty="0" smtClean="0"/>
+              <a:t> </a:t>
+            </a:r>
+            <a:r>
+              <a:rPr lang="en-US" dirty="0" smtClean="0"/>
+              <a:t>(work in progress) for testing.</a:t>
+            </a:r>
+            <a:endParaRPr lang="en-US" dirty="0" smtClean="0"/>
+          </a:p>
+        </p:txBody>
+      </p:sp>
+    </p:spTree>
+    <p:extLst>
+      <p:ext uri="{BB962C8B-B14F-4D97-AF65-F5344CB8AC3E}">
+        <p14:creationId xmlns:p14="http://schemas.microsoft.com/office/powerpoint/2010/main" val="143914837"/>
+      </p:ext>
+    </p:extLst>
+  </p:cSld>
+  <p:clrMapOvr>
+    <a:masterClrMapping/>
+  </p:clrMapOvr>
+  <p:timing>
+    <p:tnLst>
+      <p:par>
+        <p:cTn xmlns:p14="http://schemas.microsoft.com/office/powerpoint/2010/main" id="1" dur="indefinite" restart="never" nodeType="tmRoot"/>
+      </p:par>
+    </p:tnLst>
+  </p:timing>
+</p:sld>
+</file>
+
+<file path=ppt/slides/slide24.xml><?xml version="1.0" encoding="utf-8"?>
+<p:sld xmlns:a="http://schemas.openxmlformats.org/drawingml/2006/main" xmlns:r="http://schemas.openxmlformats.org/officeDocument/2006/relationships" xmlns:p="http://schemas.openxmlformats.org/presentationml/2006/main">
+  <p:cSld>
+    <p:spTree>
+      <p:nvGrpSpPr>
+        <p:cNvPr id="1" name=""/>
+        <p:cNvGrpSpPr/>
+        <p:nvPr/>
+      </p:nvGrpSpPr>
+      <p:grpSpPr>
+        <a:xfrm>
+          <a:off x="0" y="0"/>
+          <a:ext cx="0" cy="0"/>
+          <a:chOff x="0" y="0"/>
+          <a:chExt cx="0" cy="0"/>
+        </a:xfrm>
+      </p:grpSpPr>
+      <p:sp>
+        <p:nvSpPr>
+          <p:cNvPr id="2" name="Title 1"/>
+          <p:cNvSpPr>
+            <a:spLocks noGrp="1"/>
+          </p:cNvSpPr>
+          <p:nvPr>
+            <p:ph type="title"/>
+          </p:nvPr>
+        </p:nvSpPr>
+        <p:spPr/>
+        <p:txBody>
+          <a:bodyPr/>
+          <a:lstStyle/>
+          <a:p>
+            <a:r>
+              <a:rPr lang="en-US" dirty="0" smtClean="0"/>
               <a:t>Questions?</a:t>
             </a:r>
             <a:endParaRPr lang="en-US" dirty="0"/>
@@ -5577,7 +6074,7 @@
 </p:sld>
 </file>
 
-<file path=ppt/slides/slide24.xml><?xml version="1.0" encoding="utf-8"?>
+<file path=ppt/slides/slide25.xml><?xml version="1.0" encoding="utf-8"?>
 <p:sld xmlns:a="http://schemas.openxmlformats.org/drawingml/2006/main" xmlns:r="http://schemas.openxmlformats.org/officeDocument/2006/relationships" xmlns:p="http://schemas.openxmlformats.org/presentationml/2006/main">
   <p:cSld>
     <p:spTree>
@@ -5871,12 +6368,8 @@
           <a:lstStyle/>
           <a:p>
             <a:r>
-              <a:rPr lang="en-US" dirty="0"/>
-              <a:t>Built-in data </a:t>
-            </a:r>
-            <a:r>
               <a:rPr lang="en-US" dirty="0" smtClean="0"/>
-              <a:t>structures </a:t>
+              <a:t>Hashes </a:t>
             </a:r>
             <a:r>
               <a:rPr lang="en-US" dirty="0" smtClean="0">
@@ -5890,28 +6383,22 @@
       </p:sp>
       <p:pic>
         <p:nvPicPr>
-          <p:cNvPr id="2" name="Picture 1" descr="stuff.rb-2.jpg"/>
+          <p:cNvPr id="3" name="Picture 2"/>
           <p:cNvPicPr>
             <a:picLocks noChangeAspect="1"/>
           </p:cNvPicPr>
           <p:nvPr/>
         </p:nvPicPr>
         <p:blipFill>
-          <a:blip r:embed="rId2">
-            <a:extLst>
-              <a:ext uri="{28A0092B-C50C-407E-A947-70E740481C1C}">
-                <a14:useLocalDpi xmlns:a14="http://schemas.microsoft.com/office/drawing/2010/main" val="0"/>
-              </a:ext>
-            </a:extLst>
-          </a:blip>
+          <a:blip r:embed="rId2"/>
           <a:stretch>
             <a:fillRect/>
           </a:stretch>
         </p:blipFill>
         <p:spPr>
           <a:xfrm>
-            <a:off x="0" y="1413658"/>
-            <a:ext cx="9144000" cy="4923692"/>
+            <a:off x="0" y="1480181"/>
+            <a:ext cx="9144000" cy="4891195"/>
           </a:xfrm>
           <a:prstGeom prst="rect">
             <a:avLst/>
@@ -5921,7 +6408,7 @@
     </p:spTree>
     <p:extLst>
       <p:ext uri="{BB962C8B-B14F-4D97-AF65-F5344CB8AC3E}">
-        <p14:creationId xmlns:p14="http://schemas.microsoft.com/office/powerpoint/2010/main" val="3968379484"/>
+        <p14:creationId xmlns:p14="http://schemas.microsoft.com/office/powerpoint/2010/main" val="1931780199"/>
       </p:ext>
     </p:extLst>
   </p:cSld>
@@ -5971,12 +6458,8 @@
           <a:lstStyle/>
           <a:p>
             <a:r>
-              <a:rPr lang="en-US" dirty="0"/>
-              <a:t>Built-in data </a:t>
-            </a:r>
-            <a:r>
               <a:rPr lang="en-US" dirty="0" smtClean="0"/>
-              <a:t>structures </a:t>
+              <a:t>Lists </a:t>
             </a:r>
             <a:r>
               <a:rPr lang="en-US" dirty="0" smtClean="0">
@@ -5990,28 +6473,22 @@
       </p:sp>
       <p:pic>
         <p:nvPicPr>
-          <p:cNvPr id="9" name="Picture 8" descr="02-lists.rb-1.jpg"/>
+          <p:cNvPr id="2" name="Picture 1"/>
           <p:cNvPicPr>
             <a:picLocks noChangeAspect="1"/>
           </p:cNvPicPr>
           <p:nvPr/>
         </p:nvPicPr>
         <p:blipFill>
-          <a:blip r:embed="rId2">
-            <a:extLst>
-              <a:ext uri="{28A0092B-C50C-407E-A947-70E740481C1C}">
-                <a14:useLocalDpi xmlns:a14="http://schemas.microsoft.com/office/drawing/2010/main" val="0"/>
-              </a:ext>
-            </a:extLst>
-          </a:blip>
+          <a:blip r:embed="rId2"/>
           <a:stretch>
             <a:fillRect/>
           </a:stretch>
         </p:blipFill>
         <p:spPr>
           <a:xfrm>
-            <a:off x="0" y="1490567"/>
-            <a:ext cx="9144000" cy="4340292"/>
+            <a:off x="0" y="1543681"/>
+            <a:ext cx="9144000" cy="4764563"/>
           </a:xfrm>
           <a:prstGeom prst="rect">
             <a:avLst/>
@@ -6071,12 +6548,8 @@
           <a:lstStyle/>
           <a:p>
             <a:r>
-              <a:rPr lang="en-US" dirty="0"/>
-              <a:t>Built-in data </a:t>
-            </a:r>
-            <a:r>
               <a:rPr lang="en-US" dirty="0" smtClean="0"/>
-              <a:t>structures </a:t>
+              <a:t>Sets </a:t>
             </a:r>
             <a:r>
               <a:rPr lang="en-US" dirty="0" smtClean="0">
@@ -6090,28 +6563,22 @@
       </p:sp>
       <p:pic>
         <p:nvPicPr>
-          <p:cNvPr id="2" name="Picture 1" descr="03-sets.rb.jpg"/>
+          <p:cNvPr id="3" name="Picture 2"/>
           <p:cNvPicPr>
             <a:picLocks noChangeAspect="1"/>
           </p:cNvPicPr>
           <p:nvPr/>
         </p:nvPicPr>
         <p:blipFill>
-          <a:blip r:embed="rId2">
-            <a:extLst>
-              <a:ext uri="{28A0092B-C50C-407E-A947-70E740481C1C}">
-                <a14:useLocalDpi xmlns:a14="http://schemas.microsoft.com/office/drawing/2010/main" val="0"/>
-              </a:ext>
-            </a:extLst>
-          </a:blip>
+          <a:blip r:embed="rId2"/>
           <a:stretch>
             <a:fillRect/>
           </a:stretch>
         </p:blipFill>
         <p:spPr>
           <a:xfrm>
-            <a:off x="0" y="1616537"/>
-            <a:ext cx="9144000" cy="3472009"/>
+            <a:off x="0" y="1611748"/>
+            <a:ext cx="9144000" cy="4066121"/>
           </a:xfrm>
           <a:prstGeom prst="rect">
             <a:avLst/>
@@ -6186,28 +6653,22 @@
       </p:sp>
       <p:pic>
         <p:nvPicPr>
-          <p:cNvPr id="6" name="Picture 5" descr="04-incr.rb-2.jpg"/>
+          <p:cNvPr id="2" name="Picture 1"/>
           <p:cNvPicPr>
             <a:picLocks noChangeAspect="1"/>
           </p:cNvPicPr>
           <p:nvPr/>
         </p:nvPicPr>
         <p:blipFill>
-          <a:blip r:embed="rId2">
-            <a:extLst>
-              <a:ext uri="{28A0092B-C50C-407E-A947-70E740481C1C}">
-                <a14:useLocalDpi xmlns:a14="http://schemas.microsoft.com/office/drawing/2010/main" val="0"/>
-              </a:ext>
-            </a:extLst>
-          </a:blip>
+          <a:blip r:embed="rId2"/>
           <a:stretch>
             <a:fillRect/>
           </a:stretch>
         </p:blipFill>
         <p:spPr>
           <a:xfrm>
-            <a:off x="0" y="1639907"/>
-            <a:ext cx="9144000" cy="2771570"/>
+            <a:off x="0" y="1892300"/>
+            <a:ext cx="9144000" cy="3065742"/>
           </a:xfrm>
           <a:prstGeom prst="rect">
             <a:avLst/>
@@ -6282,28 +6743,22 @@
       </p:sp>
       <p:pic>
         <p:nvPicPr>
-          <p:cNvPr id="2" name="Picture 1" descr="05-expirations.rb.jpg"/>
+          <p:cNvPr id="3" name="Picture 2"/>
           <p:cNvPicPr>
             <a:picLocks noChangeAspect="1"/>
           </p:cNvPicPr>
           <p:nvPr/>
         </p:nvPicPr>
         <p:blipFill>
-          <a:blip r:embed="rId2">
-            <a:extLst>
-              <a:ext uri="{28A0092B-C50C-407E-A947-70E740481C1C}">
-                <a14:useLocalDpi xmlns:a14="http://schemas.microsoft.com/office/drawing/2010/main" val="0"/>
-              </a:ext>
-            </a:extLst>
-          </a:blip>
+          <a:blip r:embed="rId2"/>
           <a:stretch>
             <a:fillRect/>
           </a:stretch>
         </p:blipFill>
         <p:spPr>
           <a:xfrm>
-            <a:off x="0" y="1660441"/>
-            <a:ext cx="9118600" cy="2730500"/>
+            <a:off x="0" y="1854200"/>
+            <a:ext cx="9144000" cy="3135086"/>
           </a:xfrm>
           <a:prstGeom prst="rect">
             <a:avLst/>
@@ -6378,28 +6833,22 @@
       </p:sp>
       <p:pic>
         <p:nvPicPr>
-          <p:cNvPr id="3" name="Picture 2" descr="06-replication.rb.jpg"/>
+          <p:cNvPr id="2" name="Picture 1"/>
           <p:cNvPicPr>
             <a:picLocks noChangeAspect="1"/>
           </p:cNvPicPr>
           <p:nvPr/>
         </p:nvPicPr>
         <p:blipFill>
-          <a:blip r:embed="rId2">
-            <a:extLst>
-              <a:ext uri="{28A0092B-C50C-407E-A947-70E740481C1C}">
-                <a14:useLocalDpi xmlns:a14="http://schemas.microsoft.com/office/drawing/2010/main" val="0"/>
-              </a:ext>
-            </a:extLst>
-          </a:blip>
+          <a:blip r:embed="rId2"/>
           <a:stretch>
             <a:fillRect/>
           </a:stretch>
         </p:blipFill>
         <p:spPr>
           <a:xfrm>
-            <a:off x="0" y="1550973"/>
-            <a:ext cx="9144000" cy="4126096"/>
+            <a:off x="0" y="1538195"/>
+            <a:ext cx="9144000" cy="4421529"/>
           </a:xfrm>
           <a:prstGeom prst="rect">
             <a:avLst/>
@@ -6427,7 +6876,7 @@
 </file>
 
 <file path=ppt/theme/theme1.xml><?xml version="1.0" encoding="utf-8"?>
-<a:theme xmlns:a="http://schemas.openxmlformats.org/drawingml/2006/main" name=" Black ">
+<a:theme xmlns:a="http://schemas.openxmlformats.org/drawingml/2006/main" name="Office Theme">
   <a:themeElements>
     <a:clrScheme name="Office">
       <a:dk1>
@@ -6571,20 +7020,16 @@
           <a:gsLst>
             <a:gs pos="0">
               <a:schemeClr val="phClr">
-                <a:shade val="51000"/>
-                <a:satMod val="130000"/>
-              </a:schemeClr>
-            </a:gs>
-            <a:gs pos="80000">
-              <a:schemeClr val="phClr">
-                <a:shade val="93000"/>
+                <a:tint val="100000"/>
+                <a:shade val="100000"/>
                 <a:satMod val="130000"/>
               </a:schemeClr>
             </a:gs>
             <a:gs pos="100000">
               <a:schemeClr val="phClr">
-                <a:shade val="94000"/>
-                <a:satMod val="135000"/>
+                <a:tint val="50000"/>
+                <a:shade val="100000"/>
+                <a:satMod val="350000"/>
               </a:schemeClr>
             </a:gs>
           </a:gsLst>
@@ -6706,7 +7151,46 @@
       </a:bgFillStyleLst>
     </a:fmtScheme>
   </a:themeElements>
-  <a:objectDefaults/>
+  <a:objectDefaults>
+    <a:spDef>
+      <a:spPr/>
+      <a:bodyPr/>
+      <a:lstStyle/>
+      <a:style>
+        <a:lnRef idx="1">
+          <a:schemeClr val="accent1"/>
+        </a:lnRef>
+        <a:fillRef idx="3">
+          <a:schemeClr val="accent1"/>
+        </a:fillRef>
+        <a:effectRef idx="2">
+          <a:schemeClr val="accent1"/>
+        </a:effectRef>
+        <a:fontRef idx="minor">
+          <a:schemeClr val="lt1"/>
+        </a:fontRef>
+      </a:style>
+    </a:spDef>
+    <a:lnDef>
+      <a:spPr/>
+      <a:bodyPr/>
+      <a:lstStyle/>
+      <a:style>
+        <a:lnRef idx="2">
+          <a:schemeClr val="accent1"/>
+        </a:lnRef>
+        <a:fillRef idx="0">
+          <a:schemeClr val="accent1"/>
+        </a:fillRef>
+        <a:effectRef idx="1">
+          <a:schemeClr val="accent1"/>
+        </a:effectRef>
+        <a:fontRef idx="minor">
+          <a:schemeClr val="tx1"/>
+        </a:fontRef>
+      </a:style>
+    </a:lnDef>
+  </a:objectDefaults>
   <a:extraClrSchemeLst/>
 </a:theme>
 </file>
</xml_diff>

<commit_message>
Slides updated (again) for Ruby on Ales
</commit_message>
<xml_diff>
--- a/redis-groupon.pptx
+++ b/redis-groupon.pptx
@@ -3573,7 +3573,7 @@
         </p:blipFill>
         <p:spPr>
           <a:xfrm>
-            <a:off x="0" y="1417638"/>
+            <a:off x="0" y="1483977"/>
             <a:ext cx="9144000" cy="5248822"/>
           </a:xfrm>
           <a:prstGeom prst="rect">
@@ -3913,7 +3913,7 @@
         </p:blipFill>
         <p:spPr>
           <a:xfrm>
-            <a:off x="0" y="1738553"/>
+            <a:off x="0" y="1776461"/>
             <a:ext cx="9144000" cy="3190620"/>
           </a:xfrm>
           <a:prstGeom prst="rect">
@@ -4712,16 +4712,76 @@
               <a:buNone/>
             </a:pPr>
             <a:r>
-              <a:rPr lang="en-US" dirty="0" err="1"/>
+              <a:rPr lang="en-US" dirty="0" err="1" smtClean="0"/>
               <a:t>Redis</a:t>
             </a:r>
             <a:r>
+              <a:rPr lang="en-US" dirty="0" smtClean="0"/>
+              <a:t> == </a:t>
+            </a:r>
+            <a:r>
+              <a:rPr lang="en-US" b="1" i="1" dirty="0" err="1" smtClean="0"/>
+              <a:t>RE</a:t>
+            </a:r>
+            <a:r>
+              <a:rPr lang="en-US" dirty="0" err="1" smtClean="0"/>
+              <a:t>mote</a:t>
+            </a:r>
+            <a:r>
+              <a:rPr lang="en-US" dirty="0" smtClean="0"/>
+              <a:t> </a:t>
+            </a:r>
+            <a:r>
+              <a:rPr lang="en-US" b="1" i="1" dirty="0" err="1" smtClean="0"/>
+              <a:t>DI</a:t>
+            </a:r>
+            <a:r>
+              <a:rPr lang="en-US" dirty="0" err="1" smtClean="0"/>
+              <a:t>ctionary</a:t>
+            </a:r>
+            <a:r>
+              <a:rPr lang="en-US" dirty="0" smtClean="0"/>
+              <a:t> </a:t>
+            </a:r>
+            <a:r>
+              <a:rPr lang="en-US" b="1" i="1" dirty="0" smtClean="0"/>
+              <a:t>S</a:t>
+            </a:r>
+            <a:r>
+              <a:rPr lang="en-US" dirty="0" smtClean="0"/>
+              <a:t>erver</a:t>
+            </a:r>
+            <a:endParaRPr lang="en-US" sz="1600" dirty="0" smtClean="0"/>
+          </a:p>
+          <a:p>
+            <a:pPr marL="0" indent="0">
+              <a:buNone/>
+            </a:pPr>
+            <a:endParaRPr lang="en-US" dirty="0" smtClean="0"/>
+          </a:p>
+          <a:p>
+            <a:pPr marL="0" indent="0">
+              <a:buNone/>
+            </a:pPr>
+            <a:r>
+              <a:rPr lang="en-US" dirty="0" smtClean="0"/>
+              <a:t>“</a:t>
+            </a:r>
+            <a:r>
+              <a:rPr lang="en-US" dirty="0" err="1" smtClean="0"/>
+              <a:t>Redis</a:t>
+            </a:r>
+            <a:r>
+              <a:rPr lang="en-US" dirty="0" smtClean="0"/>
+              <a:t> </a:t>
+            </a:r>
+            <a:r>
               <a:rPr lang="en-US" dirty="0"/>
-              <a:t> is an open source, advanced key-value </a:t>
+              <a:t>is an open source, advanced key-value </a:t>
             </a:r>
             <a:r>
               <a:rPr lang="en-US" dirty="0" smtClean="0"/>
-              <a:t>store.</a:t>
+              <a:t>store. …</a:t>
             </a:r>
             <a:r>
               <a:rPr lang="en-US" dirty="0"/>
@@ -4729,19 +4789,23 @@
             </a:r>
             <a:r>
               <a:rPr lang="en-US" dirty="0" smtClean="0"/>
-              <a:t>… </a:t>
+              <a:t>It </a:t>
+            </a:r>
+            <a:r>
+              <a:rPr lang="en-US" dirty="0"/>
+              <a:t>is often referred to as a data structure </a:t>
             </a:r>
             <a:r>
               <a:rPr lang="en-US" dirty="0" smtClean="0"/>
-              <a:t>It </a:t>
+              <a:t>server since </a:t>
             </a:r>
             <a:r>
               <a:rPr lang="en-US" dirty="0"/>
-              <a:t>is often referred to as a data structure server since keys can contain strings, hashes, lists, sets and sorted sets</a:t>
+              <a:t>keys can contain strings, hashes, lists, sets and sorted sets</a:t>
             </a:r>
             <a:r>
               <a:rPr lang="en-US" dirty="0" smtClean="0"/>
-              <a:t>.  </a:t>
+              <a:t>.”  </a:t>
             </a:r>
             <a:r>
               <a:rPr lang="en-US" sz="1600" dirty="0" smtClean="0">
@@ -4825,52 +4889,6 @@
                 <a:prstClr val="white"/>
               </a:solidFill>
             </a:endParaRPr>
-          </a:p>
-          <a:p>
-            <a:pPr marL="0" indent="0">
-              <a:buNone/>
-            </a:pPr>
-            <a:r>
-              <a:rPr lang="en-US" dirty="0" err="1" smtClean="0"/>
-              <a:t>Redis</a:t>
-            </a:r>
-            <a:r>
-              <a:rPr lang="en-US" dirty="0" smtClean="0"/>
-              <a:t> == </a:t>
-            </a:r>
-            <a:r>
-              <a:rPr lang="en-US" b="1" i="1" dirty="0" err="1" smtClean="0"/>
-              <a:t>RE</a:t>
-            </a:r>
-            <a:r>
-              <a:rPr lang="en-US" dirty="0" err="1" smtClean="0"/>
-              <a:t>mote</a:t>
-            </a:r>
-            <a:r>
-              <a:rPr lang="en-US" dirty="0" smtClean="0"/>
-              <a:t> </a:t>
-            </a:r>
-            <a:r>
-              <a:rPr lang="en-US" b="1" i="1" dirty="0" err="1" smtClean="0"/>
-              <a:t>DI</a:t>
-            </a:r>
-            <a:r>
-              <a:rPr lang="en-US" dirty="0" err="1" smtClean="0"/>
-              <a:t>ctionary</a:t>
-            </a:r>
-            <a:r>
-              <a:rPr lang="en-US" dirty="0" smtClean="0"/>
-              <a:t> </a:t>
-            </a:r>
-            <a:r>
-              <a:rPr lang="en-US" b="1" i="1" dirty="0" smtClean="0"/>
-              <a:t>S</a:t>
-            </a:r>
-            <a:r>
-              <a:rPr lang="en-US" dirty="0" smtClean="0"/>
-              <a:t>erver</a:t>
-            </a:r>
-            <a:endParaRPr lang="en-US" sz="1600" dirty="0"/>
           </a:p>
         </p:txBody>
       </p:sp>
@@ -5417,21 +5435,22 @@
               <a:t> </a:t>
             </a:r>
             <a:r>
+              <a:rPr lang="en-US" b="1" dirty="0" smtClean="0"/>
+              <a:t>get/</a:t>
+            </a:r>
+            <a:r>
               <a:rPr lang="en-US" b="1" dirty="0" err="1" smtClean="0"/>
-              <a:t>sadd</a:t>
+              <a:t>setex</a:t>
             </a:r>
             <a:r>
               <a:rPr lang="en-US" b="1" dirty="0" smtClean="0"/>
-              <a:t>/</a:t>
-            </a:r>
-            <a:r>
-              <a:rPr lang="en-US" b="1" dirty="0" err="1" smtClean="0"/>
-              <a:t>sismember</a:t>
+              <a:t> </a:t>
             </a:r>
             <a:r>
               <a:rPr lang="en-US" dirty="0" smtClean="0"/>
-              <a:t> to prevent duplicate work</a:t>
-            </a:r>
+              <a:t>for abandoned cart reminders</a:t>
+            </a:r>
+            <a:endParaRPr lang="en-US" dirty="0" smtClean="0"/>
           </a:p>
           <a:p>
             <a:pPr marL="889000">
@@ -5850,15 +5869,7 @@
             </a:r>
             <a:r>
               <a:rPr lang="en-US" dirty="0" smtClean="0"/>
-              <a:t>Use </a:t>
-            </a:r>
-            <a:r>
-              <a:rPr lang="en-US" dirty="0" err="1" smtClean="0"/>
-              <a:t>Redis</a:t>
-            </a:r>
-            <a:r>
-              <a:rPr lang="en-US" dirty="0" smtClean="0"/>
-              <a:t> when you want its data structures.</a:t>
+              <a:t>Single-purpose instances over one multi-purpose.</a:t>
             </a:r>
           </a:p>
           <a:p>
@@ -6847,7 +6858,7 @@
         </p:blipFill>
         <p:spPr>
           <a:xfrm>
-            <a:off x="0" y="1538195"/>
+            <a:off x="0" y="1651919"/>
             <a:ext cx="9144000" cy="4421529"/>
           </a:xfrm>
           <a:prstGeom prst="rect">

</xml_diff>

<commit_message>
Updating for Chicago Heroku talk
</commit_message>
<xml_diff>
--- a/redis-groupon.pptx
+++ b/redis-groupon.pptx
@@ -312,7 +312,7 @@
           <a:p>
             <a:fld id="{6BFECD78-3C8E-49F2-8FAB-59489D168ABB}" type="datetimeFigureOut">
               <a:rPr lang="en-US" smtClean="0"/>
-              <a:t>3/2/12</a:t>
+              <a:t>3/15/12</a:t>
             </a:fld>
             <a:endParaRPr lang="en-US"/>
           </a:p>
@@ -482,7 +482,7 @@
           <a:p>
             <a:fld id="{6BFECD78-3C8E-49F2-8FAB-59489D168ABB}" type="datetimeFigureOut">
               <a:rPr lang="en-US" smtClean="0"/>
-              <a:t>3/2/12</a:t>
+              <a:t>3/15/12</a:t>
             </a:fld>
             <a:endParaRPr lang="en-US"/>
           </a:p>
@@ -662,7 +662,7 @@
           <a:p>
             <a:fld id="{6BFECD78-3C8E-49F2-8FAB-59489D168ABB}" type="datetimeFigureOut">
               <a:rPr lang="en-US" smtClean="0"/>
-              <a:t>3/2/12</a:t>
+              <a:t>3/15/12</a:t>
             </a:fld>
             <a:endParaRPr lang="en-US"/>
           </a:p>
@@ -1060,7 +1060,7 @@
           <a:p>
             <a:fld id="{6BFECD78-3C8E-49F2-8FAB-59489D168ABB}" type="datetimeFigureOut">
               <a:rPr lang="en-US" smtClean="0"/>
-              <a:t>3/2/12</a:t>
+              <a:t>3/15/12</a:t>
             </a:fld>
             <a:endParaRPr lang="en-US"/>
           </a:p>
@@ -1306,7 +1306,7 @@
           <a:p>
             <a:fld id="{6BFECD78-3C8E-49F2-8FAB-59489D168ABB}" type="datetimeFigureOut">
               <a:rPr lang="en-US" smtClean="0"/>
-              <a:t>3/2/12</a:t>
+              <a:t>3/15/12</a:t>
             </a:fld>
             <a:endParaRPr lang="en-US"/>
           </a:p>
@@ -1594,7 +1594,7 @@
           <a:p>
             <a:fld id="{6BFECD78-3C8E-49F2-8FAB-59489D168ABB}" type="datetimeFigureOut">
               <a:rPr lang="en-US" smtClean="0"/>
-              <a:t>3/2/12</a:t>
+              <a:t>3/15/12</a:t>
             </a:fld>
             <a:endParaRPr lang="en-US"/>
           </a:p>
@@ -2016,7 +2016,7 @@
           <a:p>
             <a:fld id="{6BFECD78-3C8E-49F2-8FAB-59489D168ABB}" type="datetimeFigureOut">
               <a:rPr lang="en-US" smtClean="0"/>
-              <a:t>3/2/12</a:t>
+              <a:t>3/15/12</a:t>
             </a:fld>
             <a:endParaRPr lang="en-US"/>
           </a:p>
@@ -2134,7 +2134,7 @@
           <a:p>
             <a:fld id="{6BFECD78-3C8E-49F2-8FAB-59489D168ABB}" type="datetimeFigureOut">
               <a:rPr lang="en-US" smtClean="0"/>
-              <a:t>3/2/12</a:t>
+              <a:t>3/15/12</a:t>
             </a:fld>
             <a:endParaRPr lang="en-US"/>
           </a:p>
@@ -2229,7 +2229,7 @@
           <a:p>
             <a:fld id="{6BFECD78-3C8E-49F2-8FAB-59489D168ABB}" type="datetimeFigureOut">
               <a:rPr lang="en-US" smtClean="0"/>
-              <a:t>3/2/12</a:t>
+              <a:t>3/15/12</a:t>
             </a:fld>
             <a:endParaRPr lang="en-US"/>
           </a:p>
@@ -2506,7 +2506,7 @@
           <a:p>
             <a:fld id="{6BFECD78-3C8E-49F2-8FAB-59489D168ABB}" type="datetimeFigureOut">
               <a:rPr lang="en-US" smtClean="0"/>
-              <a:t>3/2/12</a:t>
+              <a:t>3/15/12</a:t>
             </a:fld>
             <a:endParaRPr lang="en-US"/>
           </a:p>
@@ -2759,7 +2759,7 @@
           <a:p>
             <a:fld id="{6BFECD78-3C8E-49F2-8FAB-59489D168ABB}" type="datetimeFigureOut">
               <a:rPr lang="en-US" smtClean="0"/>
-              <a:t>3/2/12</a:t>
+              <a:t>3/15/12</a:t>
             </a:fld>
             <a:endParaRPr lang="en-US"/>
           </a:p>
@@ -2972,7 +2972,7 @@
           <a:p>
             <a:fld id="{6BFECD78-3C8E-49F2-8FAB-59489D168ABB}" type="datetimeFigureOut">
               <a:rPr lang="en-US" smtClean="0"/>
-              <a:t>3/2/12</a:t>
+              <a:t>3/15/12</a:t>
             </a:fld>
             <a:endParaRPr lang="en-US"/>
           </a:p>
@@ -4078,11 +4078,7 @@
           <a:p>
             <a:r>
               <a:rPr lang="en-US" dirty="0" smtClean="0"/>
-              <a:t>Keys is </a:t>
-            </a:r>
-            <a:r>
-              <a:rPr lang="en-US" dirty="0" smtClean="0"/>
-              <a:t>tempting… </a:t>
+              <a:t>Keys is tempting… </a:t>
             </a:r>
             <a:r>
               <a:rPr lang="en-US" dirty="0">
@@ -4298,11 +4294,7 @@
             </a:r>
             <a:r>
               <a:rPr lang="en-US" dirty="0" smtClean="0"/>
-              <a:t> </a:t>
-            </a:r>
-            <a:r>
-              <a:rPr lang="en-US" dirty="0" smtClean="0"/>
-              <a:t>callbacks</a:t>
+              <a:t> callbacks</a:t>
             </a:r>
             <a:r>
               <a:rPr lang="en-US" dirty="0" smtClean="0">
@@ -4331,13 +4323,7 @@
               <a:rPr lang="en-US" dirty="0" smtClean="0">
                 <a:sym typeface="Wingdings"/>
               </a:rPr>
-              <a:t> </a:t>
-            </a:r>
-            <a:r>
-              <a:rPr lang="en-US" dirty="0" smtClean="0">
-                <a:sym typeface="Wingdings"/>
-              </a:rPr>
-              <a:t>instead </a:t>
+              <a:t> instead </a:t>
             </a:r>
             <a:endParaRPr lang="en-US" dirty="0"/>
           </a:p>
@@ -4523,7 +4509,7 @@
         <p:spPr>
           <a:xfrm>
             <a:off x="457200" y="106536"/>
-            <a:ext cx="8229600" cy="2153386"/>
+            <a:ext cx="8229600" cy="1471893"/>
           </a:xfrm>
         </p:spPr>
         <p:txBody>
@@ -4536,11 +4522,7 @@
             </a:r>
             <a:r>
               <a:rPr lang="en-US" dirty="0" smtClean="0"/>
-              <a:t> </a:t>
-            </a:r>
-            <a:r>
-              <a:rPr lang="en-US" dirty="0" smtClean="0"/>
-              <a:t>not dropping data </a:t>
+              <a:t> not dropping data </a:t>
             </a:r>
             <a:r>
               <a:rPr lang="en-US" dirty="0" smtClean="0">
@@ -4548,60 +4530,13 @@
               </a:rPr>
               <a:t></a:t>
             </a:r>
-            <a:r>
-              <a:rPr lang="en-US" dirty="0" smtClean="0">
-                <a:sym typeface="Wingdings"/>
-              </a:rPr>
-              <a:t/>
-            </a:r>
-            <a:br>
-              <a:rPr lang="en-US" dirty="0" smtClean="0">
-                <a:sym typeface="Wingdings"/>
-              </a:rPr>
-            </a:br>
-            <a:r>
-              <a:rPr lang="en-US" sz="3200" dirty="0" smtClean="0">
-                <a:sym typeface="Wingdings"/>
-              </a:rPr>
-              <a:t>See: https://</a:t>
-            </a:r>
-            <a:r>
-              <a:rPr lang="en-US" sz="3200" dirty="0" err="1" smtClean="0">
-                <a:sym typeface="Wingdings"/>
-              </a:rPr>
-              <a:t>github.com</a:t>
-            </a:r>
-            <a:r>
-              <a:rPr lang="en-US" sz="3200" dirty="0" smtClean="0">
-                <a:sym typeface="Wingdings"/>
-              </a:rPr>
-              <a:t>/</a:t>
-            </a:r>
-            <a:r>
-              <a:rPr lang="en-US" sz="3200" dirty="0" err="1" smtClean="0">
-                <a:sym typeface="Wingdings"/>
-              </a:rPr>
-              <a:t>redsquirrel</a:t>
-            </a:r>
-            <a:r>
-              <a:rPr lang="en-US" sz="3200" dirty="0" smtClean="0">
-                <a:sym typeface="Wingdings"/>
-              </a:rPr>
-              <a:t>/</a:t>
-            </a:r>
-            <a:r>
-              <a:rPr lang="en-US" sz="3200" dirty="0" err="1" smtClean="0">
-                <a:sym typeface="Wingdings"/>
-              </a:rPr>
-              <a:t>resque</a:t>
-            </a:r>
             <a:endParaRPr lang="en-US" dirty="0"/>
           </a:p>
         </p:txBody>
       </p:sp>
       <p:pic>
         <p:nvPicPr>
-          <p:cNvPr id="4" name="Picture 3"/>
+          <p:cNvPr id="2" name="Picture 1"/>
           <p:cNvPicPr>
             <a:picLocks noChangeAspect="1"/>
           </p:cNvPicPr>
@@ -4615,14 +4550,97 @@
         </p:blipFill>
         <p:spPr>
           <a:xfrm>
-            <a:off x="0" y="2134135"/>
-            <a:ext cx="9144000" cy="3615655"/>
+            <a:off x="0" y="1487712"/>
+            <a:ext cx="9144000" cy="3788366"/>
           </a:xfrm>
           <a:prstGeom prst="rect">
             <a:avLst/>
           </a:prstGeom>
         </p:spPr>
       </p:pic>
+      <p:sp>
+        <p:nvSpPr>
+          <p:cNvPr id="7" name="Title 4"/>
+          <p:cNvSpPr txBox="1">
+            <a:spLocks/>
+          </p:cNvSpPr>
+          <p:nvPr/>
+        </p:nvSpPr>
+        <p:spPr>
+          <a:xfrm>
+            <a:off x="457200" y="5148436"/>
+            <a:ext cx="8229600" cy="1471893"/>
+          </a:xfrm>
+          <a:prstGeom prst="rect">
+            <a:avLst/>
+          </a:prstGeom>
+        </p:spPr>
+        <p:txBody>
+          <a:bodyPr vert="horz" lIns="91440" tIns="45720" rIns="91440" bIns="45720" rtlCol="0" anchor="ctr">
+            <a:normAutofit/>
+          </a:bodyPr>
+          <a:lstStyle>
+            <a:lvl1pPr algn="ctr" defTabSz="457200" rtl="0" eaLnBrk="1" latinLnBrk="0" hangingPunct="1">
+              <a:spcBef>
+                <a:spcPct val="0"/>
+              </a:spcBef>
+              <a:buNone/>
+              <a:defRPr sz="4400" kern="1200">
+                <a:solidFill>
+                  <a:schemeClr val="tx1"/>
+                </a:solidFill>
+                <a:latin typeface="+mj-lt"/>
+                <a:ea typeface="+mj-ea"/>
+                <a:cs typeface="+mj-cs"/>
+              </a:defRPr>
+            </a:lvl1pPr>
+          </a:lstStyle>
+          <a:p>
+            <a:r>
+              <a:rPr lang="en-US" sz="3600" dirty="0"/>
+              <a:t>Send copious +1’s </a:t>
+            </a:r>
+            <a:r>
+              <a:rPr lang="en-US" sz="3600" dirty="0" smtClean="0"/>
+              <a:t>to:</a:t>
+            </a:r>
+          </a:p>
+          <a:p>
+            <a:r>
+              <a:rPr lang="en-US" sz="2800" dirty="0" smtClean="0"/>
+              <a:t>https</a:t>
+            </a:r>
+            <a:r>
+              <a:rPr lang="en-US" sz="2800" dirty="0"/>
+              <a:t>://</a:t>
+            </a:r>
+            <a:r>
+              <a:rPr lang="en-US" sz="2800" dirty="0" err="1"/>
+              <a:t>github.com</a:t>
+            </a:r>
+            <a:r>
+              <a:rPr lang="en-US" sz="2800" dirty="0"/>
+              <a:t>/</a:t>
+            </a:r>
+            <a:r>
+              <a:rPr lang="en-US" sz="2800" dirty="0" err="1"/>
+              <a:t>defunkt</a:t>
+            </a:r>
+            <a:r>
+              <a:rPr lang="en-US" sz="2800" dirty="0"/>
+              <a:t>/</a:t>
+            </a:r>
+            <a:r>
+              <a:rPr lang="en-US" sz="2800" dirty="0" err="1"/>
+              <a:t>resque</a:t>
+            </a:r>
+            <a:r>
+              <a:rPr lang="en-US" sz="2800" dirty="0"/>
+              <a:t>/pull/531</a:t>
+            </a:r>
+          </a:p>
+        </p:txBody>
+      </p:sp>
     </p:spTree>
     <p:extLst>
       <p:ext uri="{BB962C8B-B14F-4D97-AF65-F5344CB8AC3E}">
@@ -4815,37 +4833,7 @@
                   </a:schemeClr>
                 </a:solidFill>
               </a:rPr>
-              <a:t>(</a:t>
-            </a:r>
-            <a:r>
-              <a:rPr lang="en-US" sz="1600" dirty="0" smtClean="0">
-                <a:solidFill>
-                  <a:schemeClr val="tx1">
-                    <a:lumMod val="75000"/>
-                  </a:schemeClr>
-                </a:solidFill>
-              </a:rPr>
-              <a:t>copy &amp; pasted </a:t>
-            </a:r>
-            <a:r>
-              <a:rPr lang="en-US" sz="1600" dirty="0" smtClean="0">
-                <a:solidFill>
-                  <a:schemeClr val="tx1">
-                    <a:lumMod val="75000"/>
-                  </a:schemeClr>
-                </a:solidFill>
-              </a:rPr>
-              <a:t>from </a:t>
-            </a:r>
-            <a:r>
-              <a:rPr lang="en-US" sz="1600" dirty="0" smtClean="0">
-                <a:solidFill>
-                  <a:schemeClr val="tx1">
-                    <a:lumMod val="75000"/>
-                  </a:schemeClr>
-                </a:solidFill>
-              </a:rPr>
-              <a:t>http://</a:t>
+              <a:t>(copy &amp; pasted from http://</a:t>
             </a:r>
             <a:r>
               <a:rPr lang="en-US" sz="1600" dirty="0" err="1" smtClean="0">
@@ -5450,7 +5438,6 @@
               <a:rPr lang="en-US" dirty="0" smtClean="0"/>
               <a:t>for abandoned cart reminders</a:t>
             </a:r>
-            <a:endParaRPr lang="en-US" dirty="0" smtClean="0"/>
           </a:p>
           <a:p>
             <a:pPr marL="889000">
@@ -5554,11 +5541,7 @@
           <a:p>
             <a:r>
               <a:rPr lang="en-US" dirty="0" smtClean="0"/>
-              <a:t>What hav</a:t>
-            </a:r>
-            <a:r>
-              <a:rPr lang="en-US" dirty="0" smtClean="0"/>
-              <a:t>e we learned?</a:t>
+              <a:t>What have we learned?</a:t>
             </a:r>
             <a:endParaRPr lang="en-US" dirty="0"/>
           </a:p>
@@ -5763,7 +5746,6 @@
               <a:rPr lang="en-US" dirty="0" smtClean="0"/>
               <a:t>. Keep a replica or two around.</a:t>
             </a:r>
-            <a:endParaRPr lang="en-US" dirty="0" smtClean="0"/>
           </a:p>
           <a:p>
             <a:pPr marL="889000">
@@ -5773,11 +5755,7 @@
             </a:pPr>
             <a:r>
               <a:rPr lang="en-US" dirty="0" smtClean="0"/>
-              <a:t> </a:t>
-            </a:r>
-            <a:r>
-              <a:rPr lang="en-US" dirty="0" smtClean="0"/>
-              <a:t>Upgrade to 2.4.6 made </a:t>
+              <a:t> Upgrade to 2.4.6 made </a:t>
             </a:r>
             <a:r>
               <a:rPr lang="en-US" b="1" dirty="0" err="1" smtClean="0"/>
@@ -5803,7 +5781,6 @@
               <a:rPr lang="en-US" dirty="0" smtClean="0"/>
               <a:t>.</a:t>
             </a:r>
-            <a:endParaRPr lang="en-US" dirty="0" smtClean="0"/>
           </a:p>
           <a:p>
             <a:pPr marL="889000">
@@ -5821,13 +5798,8 @@
             </a:r>
             <a:r>
               <a:rPr lang="en-US" dirty="0" smtClean="0"/>
-              <a:t> </a:t>
-            </a:r>
-            <a:r>
-              <a:rPr lang="en-US" dirty="0" smtClean="0"/>
-              <a:t>can’t be entirely trusted (see fork).</a:t>
-            </a:r>
-            <a:endParaRPr lang="en-US" dirty="0" smtClean="0"/>
+              <a:t> can’t be entirely trusted (see fork).</a:t>
+            </a:r>
           </a:p>
           <a:p>
             <a:pPr marL="889000">
@@ -5921,7 +5893,6 @@
               <a:rPr lang="en-US" dirty="0" smtClean="0"/>
               <a:t>(work in progress) for testing.</a:t>
             </a:r>
-            <a:endParaRPr lang="en-US" dirty="0" smtClean="0"/>
           </a:p>
         </p:txBody>
       </p:sp>

</xml_diff>